<commit_message>
Mis à jour, avancement etc...
</commit_message>
<xml_diff>
--- a/Avant-Projet/Stalker In The Middle.pptx
+++ b/Avant-Projet/Stalker In The Middle.pptx
@@ -6,7 +6,14 @@
   </p:sldMasterIdLst>
   <p:sldIdLst>
     <p:sldId id="256" r:id="rId2"/>
-    <p:sldId id="257" r:id="rId3"/>
+    <p:sldId id="258" r:id="rId3"/>
+    <p:sldId id="259" r:id="rId4"/>
+    <p:sldId id="257" r:id="rId5"/>
+    <p:sldId id="260" r:id="rId6"/>
+    <p:sldId id="261" r:id="rId7"/>
+    <p:sldId id="262" r:id="rId8"/>
+    <p:sldId id="263" r:id="rId9"/>
+    <p:sldId id="264" r:id="rId10"/>
   </p:sldIdLst>
   <p:sldSz cx="12192000" cy="6858000"/>
   <p:notesSz cx="6858000" cy="9144000"/>
@@ -6189,9 +6196,10 @@
           <a:bodyPr/>
           <a:lstStyle/>
           <a:p>
+            <a:pPr algn="ctr"/>
             <a:r>
               <a:rPr lang="fr-FR" dirty="0" smtClean="0"/>
-              <a:t>Objectifs du projet</a:t>
+              <a:t>L’Équipe</a:t>
             </a:r>
             <a:endParaRPr lang="fr-FR" dirty="0"/>
           </a:p>
@@ -6214,73 +6222,318 @@
           <a:p>
             <a:r>
               <a:rPr lang="fr-FR" dirty="0" smtClean="0"/>
-              <a:t>Modification de la table ARP à distance via ARP </a:t>
-            </a:r>
+              <a:t>Chef de projet: </a:t>
+            </a:r>
+          </a:p>
+          <a:p>
+            <a:pPr lvl="1"/>
+            <a:r>
+              <a:rPr lang="fr-FR" dirty="0" smtClean="0"/>
+              <a:t>Alban INQUEL</a:t>
+            </a:r>
+          </a:p>
+          <a:p>
+            <a:endParaRPr lang="fr-FR" dirty="0" smtClean="0"/>
+          </a:p>
+          <a:p>
+            <a:r>
+              <a:rPr lang="fr-FR" dirty="0" smtClean="0"/>
+              <a:t>Membre de l’équipe :</a:t>
+            </a:r>
+          </a:p>
+          <a:p>
+            <a:pPr lvl="1"/>
+            <a:r>
+              <a:rPr lang="fr-FR" dirty="0" smtClean="0"/>
+              <a:t>Christie BUNLON</a:t>
+            </a:r>
+          </a:p>
+          <a:p>
+            <a:pPr lvl="1"/>
+            <a:r>
+              <a:rPr lang="fr-FR" dirty="0" smtClean="0"/>
+              <a:t>Nicolas CHATELAIN</a:t>
+            </a:r>
+          </a:p>
+          <a:p>
+            <a:pPr lvl="1"/>
+            <a:r>
+              <a:rPr lang="fr-FR" dirty="0" smtClean="0"/>
+              <a:t>Brice HOFFMANN</a:t>
+            </a:r>
+          </a:p>
+          <a:p>
+            <a:pPr lvl="1"/>
+            <a:r>
+              <a:rPr lang="fr-FR" dirty="0" smtClean="0"/>
+              <a:t>Alban INQUEL</a:t>
+            </a:r>
+            <a:endParaRPr lang="fr-FR" dirty="0"/>
+          </a:p>
+        </p:txBody>
+      </p:sp>
+    </p:spTree>
+    <p:extLst>
+      <p:ext uri="{BB962C8B-B14F-4D97-AF65-F5344CB8AC3E}">
+        <p14:creationId xmlns:p14="http://schemas.microsoft.com/office/powerpoint/2010/main" val="3585858046"/>
+      </p:ext>
+    </p:extLst>
+  </p:cSld>
+  <p:clrMapOvr>
+    <a:masterClrMapping/>
+  </p:clrMapOvr>
+</p:sld>
+</file>
+
+<file path=ppt/slides/slide3.xml><?xml version="1.0" encoding="utf-8"?>
+<p:sld xmlns:a="http://schemas.openxmlformats.org/drawingml/2006/main" xmlns:r="http://schemas.openxmlformats.org/officeDocument/2006/relationships" xmlns:p="http://schemas.openxmlformats.org/presentationml/2006/main">
+  <p:cSld>
+    <p:spTree>
+      <p:nvGrpSpPr>
+        <p:cNvPr id="1" name=""/>
+        <p:cNvGrpSpPr/>
+        <p:nvPr/>
+      </p:nvGrpSpPr>
+      <p:grpSpPr>
+        <a:xfrm>
+          <a:off x="0" y="0"/>
+          <a:ext cx="0" cy="0"/>
+          <a:chOff x="0" y="0"/>
+          <a:chExt cx="0" cy="0"/>
+        </a:xfrm>
+      </p:grpSpPr>
+      <p:sp>
+        <p:nvSpPr>
+          <p:cNvPr id="2" name="Titre 1"/>
+          <p:cNvSpPr>
+            <a:spLocks noGrp="1"/>
+          </p:cNvSpPr>
+          <p:nvPr>
+            <p:ph type="title"/>
+          </p:nvPr>
+        </p:nvSpPr>
+        <p:spPr/>
+        <p:txBody>
+          <a:bodyPr/>
+          <a:lstStyle/>
+          <a:p>
+            <a:pPr algn="ctr"/>
             <a:r>
               <a:rPr lang="fr-FR" dirty="0" err="1" smtClean="0"/>
-              <a:t>Spoofing</a:t>
-            </a:r>
+              <a:t>Misssion</a:t>
+            </a:r>
+            <a:endParaRPr lang="fr-FR" dirty="0"/>
+          </a:p>
+        </p:txBody>
+      </p:sp>
+      <p:sp>
+        <p:nvSpPr>
+          <p:cNvPr id="3" name="Espace réservé du contenu 2"/>
+          <p:cNvSpPr>
+            <a:spLocks noGrp="1"/>
+          </p:cNvSpPr>
+          <p:nvPr>
+            <p:ph idx="1"/>
+          </p:nvPr>
+        </p:nvSpPr>
+        <p:spPr/>
+        <p:txBody>
+          <a:bodyPr/>
+          <a:lstStyle/>
+          <a:p>
+            <a:endParaRPr lang="fr-FR" dirty="0" smtClean="0"/>
+          </a:p>
+          <a:p>
+            <a:endParaRPr lang="fr-FR" dirty="0"/>
+          </a:p>
+          <a:p>
+            <a:endParaRPr lang="fr-FR" dirty="0" smtClean="0"/>
+          </a:p>
+          <a:p>
+            <a:pPr algn="ctr"/>
             <a:r>
               <a:rPr lang="fr-FR" dirty="0" smtClean="0"/>
-              <a:t>.</a:t>
-            </a:r>
-          </a:p>
-          <a:p>
+              <a:t>Interception </a:t>
+            </a:r>
+            <a:r>
+              <a:rPr lang="fr-FR" dirty="0"/>
+              <a:t>de datagrammes destinés à une machine </a:t>
+            </a:r>
+            <a:endParaRPr lang="fr-FR" dirty="0" smtClean="0"/>
+          </a:p>
+          <a:p>
+            <a:pPr marL="0" indent="0" algn="ctr">
+              <a:buNone/>
+            </a:pPr>
             <a:r>
               <a:rPr lang="fr-FR" dirty="0" smtClean="0"/>
-              <a:t>Détournement du routage via DHCP </a:t>
-            </a:r>
-            <a:r>
-              <a:rPr lang="fr-FR" dirty="0" err="1" smtClean="0"/>
-              <a:t>Spoofing</a:t>
-            </a:r>
+              <a:t>et </a:t>
+            </a:r>
+            <a:r>
+              <a:rPr lang="fr-FR" dirty="0"/>
+              <a:t>affichage de leur contenu en temps réel.</a:t>
+            </a:r>
+            <a:endParaRPr lang="fr-FR" b="1" dirty="0"/>
+          </a:p>
+          <a:p>
+            <a:endParaRPr lang="fr-FR" dirty="0"/>
+          </a:p>
+        </p:txBody>
+      </p:sp>
+    </p:spTree>
+    <p:extLst>
+      <p:ext uri="{BB962C8B-B14F-4D97-AF65-F5344CB8AC3E}">
+        <p14:creationId xmlns:p14="http://schemas.microsoft.com/office/powerpoint/2010/main" val="374442399"/>
+      </p:ext>
+    </p:extLst>
+  </p:cSld>
+  <p:clrMapOvr>
+    <a:masterClrMapping/>
+  </p:clrMapOvr>
+</p:sld>
+</file>
+
+<file path=ppt/slides/slide4.xml><?xml version="1.0" encoding="utf-8"?>
+<p:sld xmlns:a="http://schemas.openxmlformats.org/drawingml/2006/main" xmlns:r="http://schemas.openxmlformats.org/officeDocument/2006/relationships" xmlns:p="http://schemas.openxmlformats.org/presentationml/2006/main">
+  <p:cSld>
+    <p:spTree>
+      <p:nvGrpSpPr>
+        <p:cNvPr id="1" name=""/>
+        <p:cNvGrpSpPr/>
+        <p:nvPr/>
+      </p:nvGrpSpPr>
+      <p:grpSpPr>
+        <a:xfrm>
+          <a:off x="0" y="0"/>
+          <a:ext cx="0" cy="0"/>
+          <a:chOff x="0" y="0"/>
+          <a:chExt cx="0" cy="0"/>
+        </a:xfrm>
+      </p:grpSpPr>
+      <p:sp>
+        <p:nvSpPr>
+          <p:cNvPr id="2" name="Titre 1"/>
+          <p:cNvSpPr>
+            <a:spLocks noGrp="1"/>
+          </p:cNvSpPr>
+          <p:nvPr>
+            <p:ph type="title"/>
+          </p:nvPr>
+        </p:nvSpPr>
+        <p:spPr/>
+        <p:txBody>
+          <a:bodyPr/>
+          <a:lstStyle/>
+          <a:p>
+            <a:pPr algn="ctr"/>
             <a:r>
               <a:rPr lang="fr-FR" dirty="0" smtClean="0"/>
-              <a:t>.</a:t>
-            </a:r>
-          </a:p>
-          <a:p>
-            <a:r>
-              <a:rPr lang="fr-FR" dirty="0" smtClean="0"/>
-              <a:t>Interception des mots de passes transitant en clair sur le réseau.</a:t>
-            </a:r>
-          </a:p>
-          <a:p>
-            <a:r>
-              <a:rPr lang="fr-FR" dirty="0" smtClean="0"/>
-              <a:t>Interception et redirection des requêtes et réponses DNS.</a:t>
-            </a:r>
-          </a:p>
-          <a:p>
-            <a:r>
-              <a:rPr lang="fr-FR" dirty="0" smtClean="0"/>
-              <a:t>Affichage en direct des pages visités par les cibles de SITM.</a:t>
-            </a:r>
-          </a:p>
-          <a:p>
-            <a:r>
-              <a:rPr lang="fr-FR" dirty="0" smtClean="0"/>
-              <a:t>Enregistrement des conversations </a:t>
-            </a:r>
-            <a:r>
-              <a:rPr lang="fr-FR" dirty="0" err="1" smtClean="0"/>
+              <a:t>Objectifs</a:t>
+            </a:r>
+            <a:endParaRPr lang="fr-FR" dirty="0"/>
+          </a:p>
+        </p:txBody>
+      </p:sp>
+      <p:sp>
+        <p:nvSpPr>
+          <p:cNvPr id="3" name="Espace réservé du contenu 2"/>
+          <p:cNvSpPr>
+            <a:spLocks noGrp="1"/>
+          </p:cNvSpPr>
+          <p:nvPr>
+            <p:ph idx="1"/>
+          </p:nvPr>
+        </p:nvSpPr>
+        <p:spPr/>
+        <p:txBody>
+          <a:bodyPr>
+            <a:normAutofit fontScale="92500" lnSpcReduction="10000"/>
+          </a:bodyPr>
+          <a:lstStyle/>
+          <a:p>
+            <a:pPr lvl="0"/>
+            <a:r>
+              <a:rPr lang="fr-FR" dirty="0"/>
+              <a:t>Pouvoir scanner l’intégralité du réseau avant le 15/04.</a:t>
+            </a:r>
+          </a:p>
+          <a:p>
+            <a:pPr lvl="0"/>
+            <a:r>
+              <a:rPr lang="fr-FR" dirty="0"/>
+              <a:t>Pouvoir modifier la table ARP à distance avant le 22/04.</a:t>
+            </a:r>
+          </a:p>
+          <a:p>
+            <a:pPr lvl="0"/>
+            <a:r>
+              <a:rPr lang="fr-FR" dirty="0"/>
+              <a:t>Pouvoir intercepter et </a:t>
+            </a:r>
+            <a:r>
+              <a:rPr lang="fr-FR" dirty="0" err="1"/>
+              <a:t>rerouter</a:t>
+            </a:r>
+            <a:r>
+              <a:rPr lang="fr-FR" dirty="0"/>
+              <a:t> les paquets avant le 29/04.</a:t>
+            </a:r>
+          </a:p>
+          <a:p>
+            <a:pPr lvl="0"/>
+            <a:r>
+              <a:rPr lang="fr-FR" dirty="0"/>
+              <a:t>Création d’une interface graphique avant le 03/05.</a:t>
+            </a:r>
+          </a:p>
+          <a:p>
+            <a:pPr lvl="0"/>
+            <a:r>
+              <a:rPr lang="fr-FR" dirty="0"/>
+              <a:t>Pouvoir obtenir les mots de passe transitant en clair avant le 06/05.</a:t>
+            </a:r>
+          </a:p>
+          <a:p>
+            <a:pPr lvl="0"/>
+            <a:r>
+              <a:rPr lang="fr-FR" dirty="0"/>
+              <a:t>Pouvoir modifier les réponses DNS avant le 15/05.</a:t>
+            </a:r>
+          </a:p>
+          <a:p>
+            <a:pPr lvl="0"/>
+            <a:r>
+              <a:rPr lang="fr-FR" dirty="0"/>
+              <a:t>Pouvoir intégrer les cookies de la « victime » automatiquement sur la machine attaquante avant le 23/05.</a:t>
+            </a:r>
+          </a:p>
+          <a:p>
+            <a:pPr lvl="0"/>
+            <a:r>
+              <a:rPr lang="fr-FR" dirty="0"/>
+              <a:t>Affichage des pages web visitées avant le 30/05.</a:t>
+            </a:r>
+          </a:p>
+          <a:p>
+            <a:pPr lvl="0"/>
+            <a:r>
+              <a:rPr lang="fr-FR" dirty="0"/>
+              <a:t>Pouvoir intercepter les transmissions </a:t>
+            </a:r>
+            <a:r>
+              <a:rPr lang="fr-FR" dirty="0" err="1"/>
               <a:t>VoIP</a:t>
             </a:r>
             <a:r>
-              <a:rPr lang="fr-FR" dirty="0" smtClean="0"/>
-              <a:t>.</a:t>
-            </a:r>
-          </a:p>
-          <a:p>
-            <a:r>
-              <a:rPr lang="fr-FR" dirty="0" smtClean="0"/>
-              <a:t>Redirection du protocole HTTPS vers HTTP.</a:t>
-            </a:r>
-          </a:p>
-          <a:p>
-            <a:r>
-              <a:rPr lang="fr-FR" dirty="0" smtClean="0"/>
-              <a:t>Injection de vulnérabilités dans les réponses HTTP.</a:t>
+              <a:rPr lang="fr-FR" dirty="0"/>
+              <a:t> avant le 05/06.</a:t>
+            </a:r>
+          </a:p>
+          <a:p>
+            <a:pPr lvl="0"/>
+            <a:r>
+              <a:rPr lang="fr-FR" dirty="0"/>
+              <a:t>Pouvoir générer de faux certificats automatiquement avant le 13/06.</a:t>
             </a:r>
           </a:p>
           <a:p>
@@ -6341,6 +6594,351 @@
 </p:sld>
 </file>
 
+<file path=ppt/slides/slide5.xml><?xml version="1.0" encoding="utf-8"?>
+<p:sld xmlns:a="http://schemas.openxmlformats.org/drawingml/2006/main" xmlns:r="http://schemas.openxmlformats.org/officeDocument/2006/relationships" xmlns:p="http://schemas.openxmlformats.org/presentationml/2006/main">
+  <p:cSld>
+    <p:spTree>
+      <p:nvGrpSpPr>
+        <p:cNvPr id="1" name=""/>
+        <p:cNvGrpSpPr/>
+        <p:nvPr/>
+      </p:nvGrpSpPr>
+      <p:grpSpPr>
+        <a:xfrm>
+          <a:off x="0" y="0"/>
+          <a:ext cx="0" cy="0"/>
+          <a:chOff x="0" y="0"/>
+          <a:chExt cx="0" cy="0"/>
+        </a:xfrm>
+      </p:grpSpPr>
+      <p:sp>
+        <p:nvSpPr>
+          <p:cNvPr id="2" name="Titre 1"/>
+          <p:cNvSpPr>
+            <a:spLocks noGrp="1"/>
+          </p:cNvSpPr>
+          <p:nvPr>
+            <p:ph type="title"/>
+          </p:nvPr>
+        </p:nvSpPr>
+        <p:spPr>
+          <a:xfrm>
+            <a:off x="656502" y="442327"/>
+            <a:ext cx="9404723" cy="1400530"/>
+          </a:xfrm>
+        </p:spPr>
+        <p:txBody>
+          <a:bodyPr/>
+          <a:lstStyle/>
+          <a:p>
+            <a:endParaRPr lang="fr-FR" dirty="0"/>
+          </a:p>
+        </p:txBody>
+      </p:sp>
+      <p:sp>
+        <p:nvSpPr>
+          <p:cNvPr id="3" name="Espace réservé du contenu 2"/>
+          <p:cNvSpPr>
+            <a:spLocks noGrp="1"/>
+          </p:cNvSpPr>
+          <p:nvPr>
+            <p:ph idx="1"/>
+          </p:nvPr>
+        </p:nvSpPr>
+        <p:spPr/>
+        <p:txBody>
+          <a:bodyPr/>
+          <a:lstStyle/>
+          <a:p>
+            <a:endParaRPr lang="fr-FR" dirty="0"/>
+          </a:p>
+        </p:txBody>
+      </p:sp>
+    </p:spTree>
+    <p:extLst>
+      <p:ext uri="{BB962C8B-B14F-4D97-AF65-F5344CB8AC3E}">
+        <p14:creationId xmlns:p14="http://schemas.microsoft.com/office/powerpoint/2010/main" val="2955403426"/>
+      </p:ext>
+    </p:extLst>
+  </p:cSld>
+  <p:clrMapOvr>
+    <a:masterClrMapping/>
+  </p:clrMapOvr>
+</p:sld>
+</file>
+
+<file path=ppt/slides/slide6.xml><?xml version="1.0" encoding="utf-8"?>
+<p:sld xmlns:a="http://schemas.openxmlformats.org/drawingml/2006/main" xmlns:r="http://schemas.openxmlformats.org/officeDocument/2006/relationships" xmlns:p="http://schemas.openxmlformats.org/presentationml/2006/main">
+  <p:cSld>
+    <p:spTree>
+      <p:nvGrpSpPr>
+        <p:cNvPr id="1" name=""/>
+        <p:cNvGrpSpPr/>
+        <p:nvPr/>
+      </p:nvGrpSpPr>
+      <p:grpSpPr>
+        <a:xfrm>
+          <a:off x="0" y="0"/>
+          <a:ext cx="0" cy="0"/>
+          <a:chOff x="0" y="0"/>
+          <a:chExt cx="0" cy="0"/>
+        </a:xfrm>
+      </p:grpSpPr>
+      <p:sp>
+        <p:nvSpPr>
+          <p:cNvPr id="2" name="Titre 1"/>
+          <p:cNvSpPr>
+            <a:spLocks noGrp="1"/>
+          </p:cNvSpPr>
+          <p:nvPr>
+            <p:ph type="title"/>
+          </p:nvPr>
+        </p:nvSpPr>
+        <p:spPr/>
+        <p:txBody>
+          <a:bodyPr/>
+          <a:lstStyle/>
+          <a:p>
+            <a:endParaRPr lang="fr-FR"/>
+          </a:p>
+        </p:txBody>
+      </p:sp>
+      <p:sp>
+        <p:nvSpPr>
+          <p:cNvPr id="3" name="Espace réservé du contenu 2"/>
+          <p:cNvSpPr>
+            <a:spLocks noGrp="1"/>
+          </p:cNvSpPr>
+          <p:nvPr>
+            <p:ph idx="1"/>
+          </p:nvPr>
+        </p:nvSpPr>
+        <p:spPr/>
+        <p:txBody>
+          <a:bodyPr/>
+          <a:lstStyle/>
+          <a:p>
+            <a:endParaRPr lang="fr-FR"/>
+          </a:p>
+        </p:txBody>
+      </p:sp>
+    </p:spTree>
+    <p:extLst>
+      <p:ext uri="{BB962C8B-B14F-4D97-AF65-F5344CB8AC3E}">
+        <p14:creationId xmlns:p14="http://schemas.microsoft.com/office/powerpoint/2010/main" val="3050755725"/>
+      </p:ext>
+    </p:extLst>
+  </p:cSld>
+  <p:clrMapOvr>
+    <a:masterClrMapping/>
+  </p:clrMapOvr>
+</p:sld>
+</file>
+
+<file path=ppt/slides/slide7.xml><?xml version="1.0" encoding="utf-8"?>
+<p:sld xmlns:a="http://schemas.openxmlformats.org/drawingml/2006/main" xmlns:r="http://schemas.openxmlformats.org/officeDocument/2006/relationships" xmlns:p="http://schemas.openxmlformats.org/presentationml/2006/main">
+  <p:cSld>
+    <p:spTree>
+      <p:nvGrpSpPr>
+        <p:cNvPr id="1" name=""/>
+        <p:cNvGrpSpPr/>
+        <p:nvPr/>
+      </p:nvGrpSpPr>
+      <p:grpSpPr>
+        <a:xfrm>
+          <a:off x="0" y="0"/>
+          <a:ext cx="0" cy="0"/>
+          <a:chOff x="0" y="0"/>
+          <a:chExt cx="0" cy="0"/>
+        </a:xfrm>
+      </p:grpSpPr>
+      <p:sp>
+        <p:nvSpPr>
+          <p:cNvPr id="2" name="Titre 1"/>
+          <p:cNvSpPr>
+            <a:spLocks noGrp="1"/>
+          </p:cNvSpPr>
+          <p:nvPr>
+            <p:ph type="title"/>
+          </p:nvPr>
+        </p:nvSpPr>
+        <p:spPr/>
+        <p:txBody>
+          <a:bodyPr/>
+          <a:lstStyle/>
+          <a:p>
+            <a:endParaRPr lang="fr-FR"/>
+          </a:p>
+        </p:txBody>
+      </p:sp>
+      <p:sp>
+        <p:nvSpPr>
+          <p:cNvPr id="3" name="Espace réservé du contenu 2"/>
+          <p:cNvSpPr>
+            <a:spLocks noGrp="1"/>
+          </p:cNvSpPr>
+          <p:nvPr>
+            <p:ph idx="1"/>
+          </p:nvPr>
+        </p:nvSpPr>
+        <p:spPr/>
+        <p:txBody>
+          <a:bodyPr/>
+          <a:lstStyle/>
+          <a:p>
+            <a:endParaRPr lang="fr-FR"/>
+          </a:p>
+        </p:txBody>
+      </p:sp>
+    </p:spTree>
+    <p:extLst>
+      <p:ext uri="{BB962C8B-B14F-4D97-AF65-F5344CB8AC3E}">
+        <p14:creationId xmlns:p14="http://schemas.microsoft.com/office/powerpoint/2010/main" val="3636989156"/>
+      </p:ext>
+    </p:extLst>
+  </p:cSld>
+  <p:clrMapOvr>
+    <a:masterClrMapping/>
+  </p:clrMapOvr>
+</p:sld>
+</file>
+
+<file path=ppt/slides/slide8.xml><?xml version="1.0" encoding="utf-8"?>
+<p:sld xmlns:a="http://schemas.openxmlformats.org/drawingml/2006/main" xmlns:r="http://schemas.openxmlformats.org/officeDocument/2006/relationships" xmlns:p="http://schemas.openxmlformats.org/presentationml/2006/main">
+  <p:cSld>
+    <p:spTree>
+      <p:nvGrpSpPr>
+        <p:cNvPr id="1" name=""/>
+        <p:cNvGrpSpPr/>
+        <p:nvPr/>
+      </p:nvGrpSpPr>
+      <p:grpSpPr>
+        <a:xfrm>
+          <a:off x="0" y="0"/>
+          <a:ext cx="0" cy="0"/>
+          <a:chOff x="0" y="0"/>
+          <a:chExt cx="0" cy="0"/>
+        </a:xfrm>
+      </p:grpSpPr>
+      <p:sp>
+        <p:nvSpPr>
+          <p:cNvPr id="2" name="Titre 1"/>
+          <p:cNvSpPr>
+            <a:spLocks noGrp="1"/>
+          </p:cNvSpPr>
+          <p:nvPr>
+            <p:ph type="title"/>
+          </p:nvPr>
+        </p:nvSpPr>
+        <p:spPr/>
+        <p:txBody>
+          <a:bodyPr/>
+          <a:lstStyle/>
+          <a:p>
+            <a:endParaRPr lang="fr-FR"/>
+          </a:p>
+        </p:txBody>
+      </p:sp>
+      <p:sp>
+        <p:nvSpPr>
+          <p:cNvPr id="3" name="Espace réservé du contenu 2"/>
+          <p:cNvSpPr>
+            <a:spLocks noGrp="1"/>
+          </p:cNvSpPr>
+          <p:nvPr>
+            <p:ph idx="1"/>
+          </p:nvPr>
+        </p:nvSpPr>
+        <p:spPr/>
+        <p:txBody>
+          <a:bodyPr/>
+          <a:lstStyle/>
+          <a:p>
+            <a:endParaRPr lang="fr-FR"/>
+          </a:p>
+        </p:txBody>
+      </p:sp>
+    </p:spTree>
+    <p:extLst>
+      <p:ext uri="{BB962C8B-B14F-4D97-AF65-F5344CB8AC3E}">
+        <p14:creationId xmlns:p14="http://schemas.microsoft.com/office/powerpoint/2010/main" val="885271517"/>
+      </p:ext>
+    </p:extLst>
+  </p:cSld>
+  <p:clrMapOvr>
+    <a:masterClrMapping/>
+  </p:clrMapOvr>
+</p:sld>
+</file>
+
+<file path=ppt/slides/slide9.xml><?xml version="1.0" encoding="utf-8"?>
+<p:sld xmlns:a="http://schemas.openxmlformats.org/drawingml/2006/main" xmlns:r="http://schemas.openxmlformats.org/officeDocument/2006/relationships" xmlns:p="http://schemas.openxmlformats.org/presentationml/2006/main">
+  <p:cSld>
+    <p:spTree>
+      <p:nvGrpSpPr>
+        <p:cNvPr id="1" name=""/>
+        <p:cNvGrpSpPr/>
+        <p:nvPr/>
+      </p:nvGrpSpPr>
+      <p:grpSpPr>
+        <a:xfrm>
+          <a:off x="0" y="0"/>
+          <a:ext cx="0" cy="0"/>
+          <a:chOff x="0" y="0"/>
+          <a:chExt cx="0" cy="0"/>
+        </a:xfrm>
+      </p:grpSpPr>
+      <p:sp>
+        <p:nvSpPr>
+          <p:cNvPr id="2" name="Titre 1"/>
+          <p:cNvSpPr>
+            <a:spLocks noGrp="1"/>
+          </p:cNvSpPr>
+          <p:nvPr>
+            <p:ph type="title"/>
+          </p:nvPr>
+        </p:nvSpPr>
+        <p:spPr/>
+        <p:txBody>
+          <a:bodyPr/>
+          <a:lstStyle/>
+          <a:p>
+            <a:endParaRPr lang="fr-FR"/>
+          </a:p>
+        </p:txBody>
+      </p:sp>
+      <p:sp>
+        <p:nvSpPr>
+          <p:cNvPr id="3" name="Espace réservé du contenu 2"/>
+          <p:cNvSpPr>
+            <a:spLocks noGrp="1"/>
+          </p:cNvSpPr>
+          <p:nvPr>
+            <p:ph idx="1"/>
+          </p:nvPr>
+        </p:nvSpPr>
+        <p:spPr/>
+        <p:txBody>
+          <a:bodyPr/>
+          <a:lstStyle/>
+          <a:p>
+            <a:endParaRPr lang="fr-FR"/>
+          </a:p>
+        </p:txBody>
+      </p:sp>
+    </p:spTree>
+    <p:extLst>
+      <p:ext uri="{BB962C8B-B14F-4D97-AF65-F5344CB8AC3E}">
+        <p14:creationId xmlns:p14="http://schemas.microsoft.com/office/powerpoint/2010/main" val="3948367709"/>
+      </p:ext>
+    </p:extLst>
+  </p:cSld>
+  <p:clrMapOvr>
+    <a:masterClrMapping/>
+  </p:clrMapOvr>
+</p:sld>
+</file>
+
 <file path=ppt/theme/theme1.xml><?xml version="1.0" encoding="utf-8"?>
 <a:theme xmlns:a="http://schemas.openxmlformats.org/drawingml/2006/main" name="Ion">
   <a:themeElements>
@@ -6384,7 +6982,7 @@
     </a:clrScheme>
     <a:fontScheme name="Ion">
       <a:majorFont>
-        <a:latin typeface="Century Gothic" panose="020B0502020202020204"/>
+        <a:latin typeface="Century Gothic"/>
         <a:ea typeface=""/>
         <a:cs typeface=""/>
         <a:font script="Jpan" typeface="メイリオ"/>
@@ -6419,7 +7017,7 @@
         <a:font script="Geor" typeface="Sylfaen"/>
       </a:majorFont>
       <a:minorFont>
-        <a:latin typeface="Century Gothic" panose="020B0502020202020204"/>
+        <a:latin typeface="Century Gothic"/>
         <a:ea typeface=""/>
         <a:cs typeface=""/>
         <a:font script="Jpan" typeface="メイリオ"/>
@@ -6601,7 +7199,7 @@
   <a:extraClrSchemeLst/>
   <a:extLst>
     <a:ext uri="{05A4C25C-085E-4340-85A3-A5531E510DB2}">
-      <thm15:themeFamily xmlns:thm15="http://schemas.microsoft.com/office/thememl/2012/main" name="Ion" id="{B8441ADB-2E43-4AF7-B97A-BD870242C6A8}" vid="{292E63A9-BB86-4E3D-B92A-7223C6510D2E}"/>
+      <thm15:themeFamily xmlns:thm15="http://schemas.microsoft.com/office/thememl/2012/main" xmlns="" name="Ion" id="{B8441ADB-2E43-4AF7-B97A-BD870242C6A8}" vid="{292E63A9-BB86-4E3D-B92A-7223C6510D2E}"/>
     </a:ext>
   </a:extLst>
 </a:theme>

</xml_diff>

<commit_message>
powerpoint: finalisation, correction fautes après réunion de lancement
charte: corrections fautes
</commit_message>
<xml_diff>
--- a/Avant-Projet/Stalker In The Middle.pptx
+++ b/Avant-Projet/Stalker In The Middle.pptx
@@ -14,6 +14,16 @@
     <p:sldId id="262" r:id="rId8"/>
     <p:sldId id="263" r:id="rId9"/>
     <p:sldId id="264" r:id="rId10"/>
+    <p:sldId id="275" r:id="rId11"/>
+    <p:sldId id="266" r:id="rId12"/>
+    <p:sldId id="267" r:id="rId13"/>
+    <p:sldId id="268" r:id="rId14"/>
+    <p:sldId id="269" r:id="rId15"/>
+    <p:sldId id="270" r:id="rId16"/>
+    <p:sldId id="271" r:id="rId17"/>
+    <p:sldId id="272" r:id="rId18"/>
+    <p:sldId id="273" r:id="rId19"/>
+    <p:sldId id="274" r:id="rId20"/>
   </p:sldIdLst>
   <p:sldSz cx="12192000" cy="6858000"/>
   <p:notesSz cx="6858000" cy="9144000"/>
@@ -301,7 +311,7 @@
           <a:p>
             <a:fld id="{4AAD347D-5ACD-4C99-B74B-A9C85AD731AF}" type="datetimeFigureOut">
               <a:rPr lang="en-US" dirty="0"/>
-              <a:t>4/9/2013</a:t>
+              <a:t>4/11/2013</a:t>
             </a:fld>
             <a:endParaRPr lang="en-US" dirty="0"/>
           </a:p>
@@ -571,7 +581,7 @@
           <a:p>
             <a:fld id="{4509A250-FF31-4206-8172-F9D3106AACB1}" type="datetimeFigureOut">
               <a:rPr lang="en-US" dirty="0"/>
-              <a:t>4/9/2013</a:t>
+              <a:t>4/11/2013</a:t>
             </a:fld>
             <a:endParaRPr lang="en-US" dirty="0"/>
           </a:p>
@@ -760,7 +770,7 @@
           <a:p>
             <a:fld id="{4509A250-FF31-4206-8172-F9D3106AACB1}" type="datetimeFigureOut">
               <a:rPr lang="en-US" dirty="0"/>
-              <a:t>4/9/2013</a:t>
+              <a:t>4/11/2013</a:t>
             </a:fld>
             <a:endParaRPr lang="en-US" dirty="0"/>
           </a:p>
@@ -1028,7 +1038,7 @@
           <a:p>
             <a:fld id="{4509A250-FF31-4206-8172-F9D3106AACB1}" type="datetimeFigureOut">
               <a:rPr lang="en-US" dirty="0"/>
-              <a:t>4/9/2013</a:t>
+              <a:t>4/11/2013</a:t>
             </a:fld>
             <a:endParaRPr lang="en-US" dirty="0"/>
           </a:p>
@@ -1364,7 +1374,7 @@
           <a:p>
             <a:fld id="{4509A250-FF31-4206-8172-F9D3106AACB1}" type="datetimeFigureOut">
               <a:rPr lang="en-US" dirty="0"/>
-              <a:t>4/9/2013</a:t>
+              <a:t>4/11/2013</a:t>
             </a:fld>
             <a:endParaRPr lang="en-US" dirty="0"/>
           </a:p>
@@ -1982,7 +1992,7 @@
           <a:p>
             <a:fld id="{4509A250-FF31-4206-8172-F9D3106AACB1}" type="datetimeFigureOut">
               <a:rPr lang="en-US" dirty="0"/>
-              <a:t>4/9/2013</a:t>
+              <a:t>4/11/2013</a:t>
             </a:fld>
             <a:endParaRPr lang="en-US" dirty="0"/>
           </a:p>
@@ -2837,7 +2847,7 @@
           <a:p>
             <a:fld id="{4509A250-FF31-4206-8172-F9D3106AACB1}" type="datetimeFigureOut">
               <a:rPr lang="en-US" dirty="0"/>
-              <a:t>4/9/2013</a:t>
+              <a:t>4/11/2013</a:t>
             </a:fld>
             <a:endParaRPr lang="en-US" dirty="0"/>
           </a:p>
@@ -3002,7 +3012,7 @@
           <a:p>
             <a:fld id="{4509A250-FF31-4206-8172-F9D3106AACB1}" type="datetimeFigureOut">
               <a:rPr lang="en-US" dirty="0"/>
-              <a:t>4/9/2013</a:t>
+              <a:t>4/11/2013</a:t>
             </a:fld>
             <a:endParaRPr lang="en-US" dirty="0"/>
           </a:p>
@@ -3177,7 +3187,7 @@
           <a:p>
             <a:fld id="{4509A250-FF31-4206-8172-F9D3106AACB1}" type="datetimeFigureOut">
               <a:rPr lang="en-US" dirty="0"/>
-              <a:t>4/9/2013</a:t>
+              <a:t>4/11/2013</a:t>
             </a:fld>
             <a:endParaRPr lang="en-US" dirty="0"/>
           </a:p>
@@ -3342,7 +3352,7 @@
           <a:p>
             <a:fld id="{4509A250-FF31-4206-8172-F9D3106AACB1}" type="datetimeFigureOut">
               <a:rPr lang="en-US" dirty="0"/>
-              <a:t>4/9/2013</a:t>
+              <a:t>4/11/2013</a:t>
             </a:fld>
             <a:endParaRPr lang="en-US" dirty="0"/>
           </a:p>
@@ -3584,7 +3594,7 @@
           <a:p>
             <a:fld id="{9796027F-7875-4030-9381-8BD8C4F21935}" type="datetimeFigureOut">
               <a:rPr lang="en-US" dirty="0"/>
-              <a:t>4/9/2013</a:t>
+              <a:t>4/11/2013</a:t>
             </a:fld>
             <a:endParaRPr lang="en-US" dirty="0"/>
           </a:p>
@@ -3871,7 +3881,7 @@
           <a:p>
             <a:fld id="{9796027F-7875-4030-9381-8BD8C4F21935}" type="datetimeFigureOut">
               <a:rPr lang="en-US" dirty="0"/>
-              <a:t>4/9/2013</a:t>
+              <a:t>4/11/2013</a:t>
             </a:fld>
             <a:endParaRPr lang="en-US" dirty="0"/>
           </a:p>
@@ -4310,7 +4320,7 @@
           <a:p>
             <a:fld id="{9796027F-7875-4030-9381-8BD8C4F21935}" type="datetimeFigureOut">
               <a:rPr lang="en-US" dirty="0"/>
-              <a:t>4/9/2013</a:t>
+              <a:t>4/11/2013</a:t>
             </a:fld>
             <a:endParaRPr lang="en-US" dirty="0"/>
           </a:p>
@@ -4423,7 +4433,7 @@
           <a:p>
             <a:fld id="{4509A250-FF31-4206-8172-F9D3106AACB1}" type="datetimeFigureOut">
               <a:rPr lang="en-US" dirty="0"/>
-              <a:t>4/9/2013</a:t>
+              <a:t>4/11/2013</a:t>
             </a:fld>
             <a:endParaRPr lang="en-US" dirty="0"/>
           </a:p>
@@ -4513,7 +4523,7 @@
           <a:p>
             <a:fld id="{4509A250-FF31-4206-8172-F9D3106AACB1}" type="datetimeFigureOut">
               <a:rPr lang="en-US" dirty="0"/>
-              <a:t>4/9/2013</a:t>
+              <a:t>4/11/2013</a:t>
             </a:fld>
             <a:endParaRPr lang="en-US" dirty="0"/>
           </a:p>
@@ -4787,7 +4797,7 @@
           <a:p>
             <a:fld id="{4509A250-FF31-4206-8172-F9D3106AACB1}" type="datetimeFigureOut">
               <a:rPr lang="en-US" dirty="0"/>
-              <a:t>4/9/2013</a:t>
+              <a:t>4/11/2013</a:t>
             </a:fld>
             <a:endParaRPr lang="en-US" dirty="0"/>
           </a:p>
@@ -5057,7 +5067,7 @@
           <a:p>
             <a:fld id="{4509A250-FF31-4206-8172-F9D3106AACB1}" type="datetimeFigureOut">
               <a:rPr lang="en-US" dirty="0"/>
-              <a:t>4/9/2013</a:t>
+              <a:t>4/11/2013</a:t>
             </a:fld>
             <a:endParaRPr lang="en-US" dirty="0"/>
           </a:p>
@@ -5481,7 +5491,7 @@
           <a:p>
             <a:fld id="{4AAD347D-5ACD-4C99-B74B-A9C85AD731AF}" type="datetimeFigureOut">
               <a:rPr lang="en-US" dirty="0"/>
-              <a:t>4/9/2013</a:t>
+              <a:t>4/11/2013</a:t>
             </a:fld>
             <a:endParaRPr lang="en-US" dirty="0"/>
           </a:p>
@@ -6164,6 +6174,1527 @@
 </p:sld>
 </file>
 
+<file path=ppt/slides/slide10.xml><?xml version="1.0" encoding="utf-8"?>
+<p:sld xmlns:a="http://schemas.openxmlformats.org/drawingml/2006/main" xmlns:r="http://schemas.openxmlformats.org/officeDocument/2006/relationships" xmlns:p="http://schemas.openxmlformats.org/presentationml/2006/main">
+  <p:cSld>
+    <p:spTree>
+      <p:nvGrpSpPr>
+        <p:cNvPr id="1" name=""/>
+        <p:cNvGrpSpPr/>
+        <p:nvPr/>
+      </p:nvGrpSpPr>
+      <p:grpSpPr>
+        <a:xfrm>
+          <a:off x="0" y="0"/>
+          <a:ext cx="0" cy="0"/>
+          <a:chOff x="0" y="0"/>
+          <a:chExt cx="0" cy="0"/>
+        </a:xfrm>
+      </p:grpSpPr>
+      <p:sp>
+        <p:nvSpPr>
+          <p:cNvPr id="2" name="Titre 1"/>
+          <p:cNvSpPr>
+            <a:spLocks noGrp="1"/>
+          </p:cNvSpPr>
+          <p:nvPr>
+            <p:ph type="title"/>
+          </p:nvPr>
+        </p:nvSpPr>
+        <p:spPr/>
+        <p:txBody>
+          <a:bodyPr/>
+          <a:lstStyle/>
+          <a:p>
+            <a:pPr algn="ctr"/>
+            <a:r>
+              <a:rPr lang="fr-FR" dirty="0" smtClean="0"/>
+              <a:t>Fonctionnalités</a:t>
+            </a:r>
+            <a:endParaRPr lang="fr-FR" dirty="0"/>
+          </a:p>
+        </p:txBody>
+      </p:sp>
+      <p:sp>
+        <p:nvSpPr>
+          <p:cNvPr id="3" name="Espace réservé du contenu 2"/>
+          <p:cNvSpPr>
+            <a:spLocks noGrp="1"/>
+          </p:cNvSpPr>
+          <p:nvPr>
+            <p:ph idx="1"/>
+          </p:nvPr>
+        </p:nvSpPr>
+        <p:spPr/>
+        <p:txBody>
+          <a:bodyPr/>
+          <a:lstStyle/>
+          <a:p>
+            <a:r>
+              <a:rPr lang="fr-FR" dirty="0" smtClean="0"/>
+              <a:t>Affichage des pages web visités</a:t>
+            </a:r>
+            <a:endParaRPr lang="fr-FR" dirty="0"/>
+          </a:p>
+          <a:p>
+            <a:pPr lvl="1"/>
+            <a:r>
+              <a:rPr lang="fr-FR" dirty="0" smtClean="0"/>
+              <a:t>Interpréter les réponses HTTP</a:t>
+            </a:r>
+          </a:p>
+          <a:p>
+            <a:pPr lvl="1"/>
+            <a:r>
+              <a:rPr lang="fr-FR" dirty="0" smtClean="0"/>
+              <a:t>Utilisation de </a:t>
+            </a:r>
+            <a:r>
+              <a:rPr lang="fr-FR" dirty="0" err="1" smtClean="0"/>
+              <a:t>WebKit</a:t>
+            </a:r>
+            <a:r>
+              <a:rPr lang="fr-FR" dirty="0" smtClean="0"/>
+              <a:t> pour afficher la page.</a:t>
+            </a:r>
+          </a:p>
+          <a:p>
+            <a:r>
+              <a:rPr lang="fr-FR" dirty="0" smtClean="0"/>
+              <a:t>Intercepter les conversations VoIP</a:t>
+            </a:r>
+          </a:p>
+          <a:p>
+            <a:pPr lvl="1"/>
+            <a:r>
+              <a:rPr lang="fr-FR" dirty="0" smtClean="0"/>
+              <a:t>Utilisation de librairies PERL</a:t>
+            </a:r>
+          </a:p>
+          <a:p>
+            <a:pPr lvl="1"/>
+            <a:r>
+              <a:rPr lang="fr-FR" dirty="0" smtClean="0"/>
+              <a:t>Convertir le flux en format audio</a:t>
+            </a:r>
+          </a:p>
+          <a:p>
+            <a:r>
+              <a:rPr lang="fr-FR" dirty="0" smtClean="0"/>
+              <a:t>Contourner le flux sécurisé</a:t>
+            </a:r>
+          </a:p>
+          <a:p>
+            <a:pPr lvl="1"/>
+            <a:r>
+              <a:rPr lang="fr-FR" dirty="0" smtClean="0"/>
+              <a:t>Générer de faux certificats SSL</a:t>
+            </a:r>
+          </a:p>
+          <a:p>
+            <a:pPr lvl="1"/>
+            <a:r>
+              <a:rPr lang="fr-FR" dirty="0" smtClean="0"/>
+              <a:t>Rediriger les liens HTTPS en HTTP.</a:t>
+            </a:r>
+          </a:p>
+          <a:p>
+            <a:pPr lvl="1"/>
+            <a:endParaRPr lang="fr-FR" dirty="0" smtClean="0"/>
+          </a:p>
+          <a:p>
+            <a:pPr marL="457200" lvl="1" indent="0">
+              <a:buNone/>
+            </a:pPr>
+            <a:endParaRPr lang="fr-FR" dirty="0" smtClean="0"/>
+          </a:p>
+          <a:p>
+            <a:pPr marL="457200" lvl="1" indent="0">
+              <a:buNone/>
+            </a:pPr>
+            <a:endParaRPr lang="fr-FR" dirty="0"/>
+          </a:p>
+        </p:txBody>
+      </p:sp>
+      <p:pic>
+        <p:nvPicPr>
+          <p:cNvPr id="4" name="Image 3"/>
+          <p:cNvPicPr>
+            <a:picLocks noChangeAspect="1"/>
+          </p:cNvPicPr>
+          <p:nvPr/>
+        </p:nvPicPr>
+        <p:blipFill>
+          <a:blip r:embed="rId2">
+            <a:extLst>
+              <a:ext uri="{28A0092B-C50C-407E-A947-70E740481C1C}">
+                <a14:useLocalDpi xmlns:a14="http://schemas.microsoft.com/office/drawing/2010/main" val="0"/>
+              </a:ext>
+            </a:extLst>
+          </a:blip>
+          <a:stretch>
+            <a:fillRect/>
+          </a:stretch>
+        </p:blipFill>
+        <p:spPr>
+          <a:xfrm>
+            <a:off x="10480367" y="556927"/>
+            <a:ext cx="596056" cy="596056"/>
+          </a:xfrm>
+          <a:prstGeom prst="rect">
+            <a:avLst/>
+          </a:prstGeom>
+        </p:spPr>
+      </p:pic>
+    </p:spTree>
+    <p:extLst>
+      <p:ext uri="{BB962C8B-B14F-4D97-AF65-F5344CB8AC3E}">
+        <p14:creationId xmlns:p14="http://schemas.microsoft.com/office/powerpoint/2010/main" val="3780280008"/>
+      </p:ext>
+    </p:extLst>
+  </p:cSld>
+  <p:clrMapOvr>
+    <a:masterClrMapping/>
+  </p:clrMapOvr>
+</p:sld>
+</file>
+
+<file path=ppt/slides/slide11.xml><?xml version="1.0" encoding="utf-8"?>
+<p:sld xmlns:a="http://schemas.openxmlformats.org/drawingml/2006/main" xmlns:r="http://schemas.openxmlformats.org/officeDocument/2006/relationships" xmlns:p="http://schemas.openxmlformats.org/presentationml/2006/main">
+  <p:cSld>
+    <p:spTree>
+      <p:nvGrpSpPr>
+        <p:cNvPr id="1" name=""/>
+        <p:cNvGrpSpPr/>
+        <p:nvPr/>
+      </p:nvGrpSpPr>
+      <p:grpSpPr>
+        <a:xfrm>
+          <a:off x="0" y="0"/>
+          <a:ext cx="0" cy="0"/>
+          <a:chOff x="0" y="0"/>
+          <a:chExt cx="0" cy="0"/>
+        </a:xfrm>
+      </p:grpSpPr>
+      <p:sp>
+        <p:nvSpPr>
+          <p:cNvPr id="2" name="Titre 1"/>
+          <p:cNvSpPr>
+            <a:spLocks noGrp="1"/>
+          </p:cNvSpPr>
+          <p:nvPr>
+            <p:ph type="title"/>
+          </p:nvPr>
+        </p:nvSpPr>
+        <p:spPr/>
+        <p:txBody>
+          <a:bodyPr/>
+          <a:lstStyle/>
+          <a:p>
+            <a:pPr algn="ctr"/>
+            <a:r>
+              <a:rPr lang="fr-FR" dirty="0" smtClean="0"/>
+              <a:t>Contraintes</a:t>
+            </a:r>
+            <a:endParaRPr lang="fr-FR" dirty="0"/>
+          </a:p>
+        </p:txBody>
+      </p:sp>
+      <p:sp>
+        <p:nvSpPr>
+          <p:cNvPr id="3" name="Espace réservé du contenu 2"/>
+          <p:cNvSpPr>
+            <a:spLocks noGrp="1"/>
+          </p:cNvSpPr>
+          <p:nvPr>
+            <p:ph idx="1"/>
+          </p:nvPr>
+        </p:nvSpPr>
+        <p:spPr/>
+        <p:txBody>
+          <a:bodyPr/>
+          <a:lstStyle/>
+          <a:p>
+            <a:endParaRPr lang="fr-FR" dirty="0"/>
+          </a:p>
+          <a:p>
+            <a:r>
+              <a:rPr lang="fr-FR" dirty="0" smtClean="0"/>
+              <a:t>Sécurité:</a:t>
+            </a:r>
+          </a:p>
+          <a:p>
+            <a:pPr lvl="1"/>
+            <a:r>
+              <a:rPr lang="fr-FR" dirty="0" smtClean="0"/>
+              <a:t>Utilisation réseau privé lors des tests</a:t>
+            </a:r>
+          </a:p>
+          <a:p>
+            <a:endParaRPr lang="fr-FR" dirty="0" smtClean="0"/>
+          </a:p>
+          <a:p>
+            <a:endParaRPr lang="fr-FR" dirty="0"/>
+          </a:p>
+          <a:p>
+            <a:r>
+              <a:rPr lang="fr-FR" dirty="0" smtClean="0"/>
+              <a:t>Organisation:</a:t>
+            </a:r>
+          </a:p>
+          <a:p>
+            <a:pPr lvl="1"/>
+            <a:r>
+              <a:rPr lang="fr-FR" dirty="0" smtClean="0"/>
+              <a:t>Projet géré sur </a:t>
+            </a:r>
+            <a:r>
+              <a:rPr lang="fr-FR" dirty="0" err="1" smtClean="0"/>
+              <a:t>GitHub</a:t>
+            </a:r>
+            <a:endParaRPr lang="fr-FR" dirty="0"/>
+          </a:p>
+        </p:txBody>
+      </p:sp>
+      <p:pic>
+        <p:nvPicPr>
+          <p:cNvPr id="4" name="Image 3"/>
+          <p:cNvPicPr>
+            <a:picLocks noChangeAspect="1"/>
+          </p:cNvPicPr>
+          <p:nvPr/>
+        </p:nvPicPr>
+        <p:blipFill>
+          <a:blip r:embed="rId2">
+            <a:extLst>
+              <a:ext uri="{28A0092B-C50C-407E-A947-70E740481C1C}">
+                <a14:useLocalDpi xmlns:a14="http://schemas.microsoft.com/office/drawing/2010/main" val="0"/>
+              </a:ext>
+            </a:extLst>
+          </a:blip>
+          <a:stretch>
+            <a:fillRect/>
+          </a:stretch>
+        </p:blipFill>
+        <p:spPr>
+          <a:xfrm>
+            <a:off x="10480367" y="556927"/>
+            <a:ext cx="596056" cy="596056"/>
+          </a:xfrm>
+          <a:prstGeom prst="rect">
+            <a:avLst/>
+          </a:prstGeom>
+        </p:spPr>
+      </p:pic>
+    </p:spTree>
+    <p:extLst>
+      <p:ext uri="{BB962C8B-B14F-4D97-AF65-F5344CB8AC3E}">
+        <p14:creationId xmlns:p14="http://schemas.microsoft.com/office/powerpoint/2010/main" val="1149858594"/>
+      </p:ext>
+    </p:extLst>
+  </p:cSld>
+  <p:clrMapOvr>
+    <a:masterClrMapping/>
+  </p:clrMapOvr>
+</p:sld>
+</file>
+
+<file path=ppt/slides/slide12.xml><?xml version="1.0" encoding="utf-8"?>
+<p:sld xmlns:a="http://schemas.openxmlformats.org/drawingml/2006/main" xmlns:r="http://schemas.openxmlformats.org/officeDocument/2006/relationships" xmlns:p="http://schemas.openxmlformats.org/presentationml/2006/main">
+  <p:cSld>
+    <p:spTree>
+      <p:nvGrpSpPr>
+        <p:cNvPr id="1" name=""/>
+        <p:cNvGrpSpPr/>
+        <p:nvPr/>
+      </p:nvGrpSpPr>
+      <p:grpSpPr>
+        <a:xfrm>
+          <a:off x="0" y="0"/>
+          <a:ext cx="0" cy="0"/>
+          <a:chOff x="0" y="0"/>
+          <a:chExt cx="0" cy="0"/>
+        </a:xfrm>
+      </p:grpSpPr>
+      <p:sp>
+        <p:nvSpPr>
+          <p:cNvPr id="2" name="Titre 1"/>
+          <p:cNvSpPr>
+            <a:spLocks noGrp="1"/>
+          </p:cNvSpPr>
+          <p:nvPr>
+            <p:ph type="title"/>
+          </p:nvPr>
+        </p:nvSpPr>
+        <p:spPr/>
+        <p:txBody>
+          <a:bodyPr/>
+          <a:lstStyle/>
+          <a:p>
+            <a:pPr algn="ctr"/>
+            <a:r>
+              <a:rPr lang="fr-FR" dirty="0" smtClean="0"/>
+              <a:t>Attributs de qualité</a:t>
+            </a:r>
+            <a:endParaRPr lang="fr-FR" dirty="0"/>
+          </a:p>
+        </p:txBody>
+      </p:sp>
+      <p:sp>
+        <p:nvSpPr>
+          <p:cNvPr id="3" name="Espace réservé du contenu 2"/>
+          <p:cNvSpPr>
+            <a:spLocks noGrp="1"/>
+          </p:cNvSpPr>
+          <p:nvPr>
+            <p:ph idx="1"/>
+          </p:nvPr>
+        </p:nvSpPr>
+        <p:spPr/>
+        <p:txBody>
+          <a:bodyPr/>
+          <a:lstStyle/>
+          <a:p>
+            <a:r>
+              <a:rPr lang="fr-FR" dirty="0" smtClean="0"/>
+              <a:t>Solution destinée au système Unix contre tous les systèmes</a:t>
+            </a:r>
+          </a:p>
+          <a:p>
+            <a:endParaRPr lang="fr-FR" dirty="0" smtClean="0"/>
+          </a:p>
+          <a:p>
+            <a:r>
+              <a:rPr lang="fr-FR" dirty="0" smtClean="0"/>
+              <a:t>Stabilité</a:t>
+            </a:r>
+          </a:p>
+          <a:p>
+            <a:endParaRPr lang="fr-FR" dirty="0" smtClean="0"/>
+          </a:p>
+          <a:p>
+            <a:r>
+              <a:rPr lang="fr-FR" dirty="0" smtClean="0"/>
+              <a:t>Légèreté</a:t>
+            </a:r>
+          </a:p>
+          <a:p>
+            <a:endParaRPr lang="fr-FR" dirty="0" smtClean="0"/>
+          </a:p>
+          <a:p>
+            <a:r>
+              <a:rPr lang="fr-FR" dirty="0" smtClean="0"/>
+              <a:t>Rapidité</a:t>
+            </a:r>
+          </a:p>
+          <a:p>
+            <a:endParaRPr lang="fr-FR" dirty="0" smtClean="0"/>
+          </a:p>
+          <a:p>
+            <a:r>
+              <a:rPr lang="fr-FR" dirty="0" smtClean="0"/>
+              <a:t>Configuration en fonction des besoins de l’utilisateur</a:t>
+            </a:r>
+          </a:p>
+          <a:p>
+            <a:endParaRPr lang="fr-FR" dirty="0"/>
+          </a:p>
+        </p:txBody>
+      </p:sp>
+      <p:pic>
+        <p:nvPicPr>
+          <p:cNvPr id="4" name="Image 3"/>
+          <p:cNvPicPr>
+            <a:picLocks noChangeAspect="1"/>
+          </p:cNvPicPr>
+          <p:nvPr/>
+        </p:nvPicPr>
+        <p:blipFill>
+          <a:blip r:embed="rId2">
+            <a:extLst>
+              <a:ext uri="{28A0092B-C50C-407E-A947-70E740481C1C}">
+                <a14:useLocalDpi xmlns:a14="http://schemas.microsoft.com/office/drawing/2010/main" val="0"/>
+              </a:ext>
+            </a:extLst>
+          </a:blip>
+          <a:stretch>
+            <a:fillRect/>
+          </a:stretch>
+        </p:blipFill>
+        <p:spPr>
+          <a:xfrm>
+            <a:off x="10480367" y="556927"/>
+            <a:ext cx="596056" cy="596056"/>
+          </a:xfrm>
+          <a:prstGeom prst="rect">
+            <a:avLst/>
+          </a:prstGeom>
+        </p:spPr>
+      </p:pic>
+    </p:spTree>
+    <p:extLst>
+      <p:ext uri="{BB962C8B-B14F-4D97-AF65-F5344CB8AC3E}">
+        <p14:creationId xmlns:p14="http://schemas.microsoft.com/office/powerpoint/2010/main" val="4065914822"/>
+      </p:ext>
+    </p:extLst>
+  </p:cSld>
+  <p:clrMapOvr>
+    <a:masterClrMapping/>
+  </p:clrMapOvr>
+</p:sld>
+</file>
+
+<file path=ppt/slides/slide13.xml><?xml version="1.0" encoding="utf-8"?>
+<p:sld xmlns:a="http://schemas.openxmlformats.org/drawingml/2006/main" xmlns:r="http://schemas.openxmlformats.org/officeDocument/2006/relationships" xmlns:p="http://schemas.openxmlformats.org/presentationml/2006/main">
+  <p:cSld>
+    <p:spTree>
+      <p:nvGrpSpPr>
+        <p:cNvPr id="1" name=""/>
+        <p:cNvGrpSpPr/>
+        <p:nvPr/>
+      </p:nvGrpSpPr>
+      <p:grpSpPr>
+        <a:xfrm>
+          <a:off x="0" y="0"/>
+          <a:ext cx="0" cy="0"/>
+          <a:chOff x="0" y="0"/>
+          <a:chExt cx="0" cy="0"/>
+        </a:xfrm>
+      </p:grpSpPr>
+      <p:sp>
+        <p:nvSpPr>
+          <p:cNvPr id="2" name="Titre 1"/>
+          <p:cNvSpPr>
+            <a:spLocks noGrp="1"/>
+          </p:cNvSpPr>
+          <p:nvPr>
+            <p:ph type="title"/>
+          </p:nvPr>
+        </p:nvSpPr>
+        <p:spPr/>
+        <p:txBody>
+          <a:bodyPr/>
+          <a:lstStyle/>
+          <a:p>
+            <a:pPr algn="ctr"/>
+            <a:r>
+              <a:rPr lang="fr-FR" dirty="0" smtClean="0"/>
+              <a:t>Partie prenante</a:t>
+            </a:r>
+            <a:endParaRPr lang="fr-FR" dirty="0"/>
+          </a:p>
+        </p:txBody>
+      </p:sp>
+      <p:sp>
+        <p:nvSpPr>
+          <p:cNvPr id="3" name="Espace réservé du contenu 2"/>
+          <p:cNvSpPr>
+            <a:spLocks noGrp="1"/>
+          </p:cNvSpPr>
+          <p:nvPr>
+            <p:ph idx="1"/>
+          </p:nvPr>
+        </p:nvSpPr>
+        <p:spPr/>
+        <p:txBody>
+          <a:bodyPr/>
+          <a:lstStyle/>
+          <a:p>
+            <a:r>
+              <a:rPr lang="fr-FR" dirty="0" smtClean="0"/>
+              <a:t>Eric Lalitte</a:t>
+            </a:r>
+          </a:p>
+          <a:p>
+            <a:endParaRPr lang="fr-FR" dirty="0" smtClean="0"/>
+          </a:p>
+          <a:p>
+            <a:r>
+              <a:rPr lang="fr-FR" dirty="0" smtClean="0"/>
+              <a:t>IN’TECH INFO</a:t>
+            </a:r>
+          </a:p>
+          <a:p>
+            <a:endParaRPr lang="fr-FR" dirty="0" smtClean="0"/>
+          </a:p>
+          <a:p>
+            <a:r>
+              <a:rPr lang="fr-FR" dirty="0" smtClean="0"/>
+              <a:t>Équipe SITM</a:t>
+            </a:r>
+          </a:p>
+          <a:p>
+            <a:endParaRPr lang="fr-FR" dirty="0" smtClean="0"/>
+          </a:p>
+          <a:p>
+            <a:r>
+              <a:rPr lang="fr-FR" dirty="0" smtClean="0"/>
+              <a:t>IN’TECHOES</a:t>
+            </a:r>
+          </a:p>
+          <a:p>
+            <a:endParaRPr lang="fr-FR" dirty="0" smtClean="0"/>
+          </a:p>
+          <a:p>
+            <a:r>
+              <a:rPr lang="fr-FR" dirty="0" smtClean="0"/>
+              <a:t>COM’ ESIEA</a:t>
+            </a:r>
+            <a:endParaRPr lang="fr-FR" dirty="0"/>
+          </a:p>
+        </p:txBody>
+      </p:sp>
+      <p:pic>
+        <p:nvPicPr>
+          <p:cNvPr id="4" name="Image 3"/>
+          <p:cNvPicPr>
+            <a:picLocks noChangeAspect="1"/>
+          </p:cNvPicPr>
+          <p:nvPr/>
+        </p:nvPicPr>
+        <p:blipFill>
+          <a:blip r:embed="rId2">
+            <a:extLst>
+              <a:ext uri="{28A0092B-C50C-407E-A947-70E740481C1C}">
+                <a14:useLocalDpi xmlns:a14="http://schemas.microsoft.com/office/drawing/2010/main" val="0"/>
+              </a:ext>
+            </a:extLst>
+          </a:blip>
+          <a:stretch>
+            <a:fillRect/>
+          </a:stretch>
+        </p:blipFill>
+        <p:spPr>
+          <a:xfrm>
+            <a:off x="10480367" y="556927"/>
+            <a:ext cx="596056" cy="596056"/>
+          </a:xfrm>
+          <a:prstGeom prst="rect">
+            <a:avLst/>
+          </a:prstGeom>
+        </p:spPr>
+      </p:pic>
+    </p:spTree>
+    <p:extLst>
+      <p:ext uri="{BB962C8B-B14F-4D97-AF65-F5344CB8AC3E}">
+        <p14:creationId xmlns:p14="http://schemas.microsoft.com/office/powerpoint/2010/main" val="1530803701"/>
+      </p:ext>
+    </p:extLst>
+  </p:cSld>
+  <p:clrMapOvr>
+    <a:masterClrMapping/>
+  </p:clrMapOvr>
+</p:sld>
+</file>
+
+<file path=ppt/slides/slide14.xml><?xml version="1.0" encoding="utf-8"?>
+<p:sld xmlns:a="http://schemas.openxmlformats.org/drawingml/2006/main" xmlns:r="http://schemas.openxmlformats.org/officeDocument/2006/relationships" xmlns:p="http://schemas.openxmlformats.org/presentationml/2006/main">
+  <p:cSld>
+    <p:spTree>
+      <p:nvGrpSpPr>
+        <p:cNvPr id="1" name=""/>
+        <p:cNvGrpSpPr/>
+        <p:nvPr/>
+      </p:nvGrpSpPr>
+      <p:grpSpPr>
+        <a:xfrm>
+          <a:off x="0" y="0"/>
+          <a:ext cx="0" cy="0"/>
+          <a:chOff x="0" y="0"/>
+          <a:chExt cx="0" cy="0"/>
+        </a:xfrm>
+      </p:grpSpPr>
+      <p:sp>
+        <p:nvSpPr>
+          <p:cNvPr id="2" name="Titre 1"/>
+          <p:cNvSpPr>
+            <a:spLocks noGrp="1"/>
+          </p:cNvSpPr>
+          <p:nvPr>
+            <p:ph type="title"/>
+          </p:nvPr>
+        </p:nvSpPr>
+        <p:spPr/>
+        <p:txBody>
+          <a:bodyPr/>
+          <a:lstStyle/>
+          <a:p>
+            <a:pPr algn="ctr"/>
+            <a:r>
+              <a:rPr lang="fr-FR" dirty="0" smtClean="0"/>
+              <a:t>Gestion planning</a:t>
+            </a:r>
+            <a:endParaRPr lang="fr-FR" dirty="0"/>
+          </a:p>
+        </p:txBody>
+      </p:sp>
+      <p:sp>
+        <p:nvSpPr>
+          <p:cNvPr id="3" name="Espace réservé du contenu 2"/>
+          <p:cNvSpPr>
+            <a:spLocks noGrp="1"/>
+          </p:cNvSpPr>
+          <p:nvPr>
+            <p:ph idx="1"/>
+          </p:nvPr>
+        </p:nvSpPr>
+        <p:spPr/>
+        <p:txBody>
+          <a:bodyPr/>
+          <a:lstStyle/>
+          <a:p>
+            <a:endParaRPr lang="fr-FR" dirty="0" smtClean="0"/>
+          </a:p>
+          <a:p>
+            <a:r>
+              <a:rPr lang="fr-FR" dirty="0" smtClean="0"/>
+              <a:t>2 plannings:</a:t>
+            </a:r>
+          </a:p>
+          <a:p>
+            <a:pPr lvl="1"/>
+            <a:r>
+              <a:rPr lang="fr-FR" dirty="0" smtClean="0"/>
+              <a:t>Référence</a:t>
+            </a:r>
+          </a:p>
+          <a:p>
+            <a:pPr lvl="1"/>
+            <a:r>
+              <a:rPr lang="fr-FR" dirty="0" smtClean="0"/>
+              <a:t>Mis à jour pendant le semestre</a:t>
+            </a:r>
+          </a:p>
+          <a:p>
+            <a:pPr lvl="1"/>
+            <a:endParaRPr lang="fr-FR" dirty="0" smtClean="0"/>
+          </a:p>
+          <a:p>
+            <a:pPr lvl="1"/>
+            <a:endParaRPr lang="fr-FR" dirty="0"/>
+          </a:p>
+          <a:p>
+            <a:pPr lvl="1"/>
+            <a:r>
+              <a:rPr lang="fr-FR" dirty="0" smtClean="0"/>
+              <a:t>Vue macro mise à jour toutes les 2 semaines par Brice</a:t>
+            </a:r>
+          </a:p>
+          <a:p>
+            <a:pPr lvl="1"/>
+            <a:r>
+              <a:rPr lang="fr-FR" dirty="0" smtClean="0"/>
+              <a:t>Vue micro mise à jour après finalisation d’une tâche par l’équipe</a:t>
+            </a:r>
+          </a:p>
+          <a:p>
+            <a:pPr marL="457200" lvl="1" indent="0">
+              <a:buNone/>
+            </a:pPr>
+            <a:endParaRPr lang="fr-FR" dirty="0"/>
+          </a:p>
+        </p:txBody>
+      </p:sp>
+      <p:pic>
+        <p:nvPicPr>
+          <p:cNvPr id="4" name="Image 3"/>
+          <p:cNvPicPr>
+            <a:picLocks noChangeAspect="1"/>
+          </p:cNvPicPr>
+          <p:nvPr/>
+        </p:nvPicPr>
+        <p:blipFill>
+          <a:blip r:embed="rId2">
+            <a:extLst>
+              <a:ext uri="{28A0092B-C50C-407E-A947-70E740481C1C}">
+                <a14:useLocalDpi xmlns:a14="http://schemas.microsoft.com/office/drawing/2010/main" val="0"/>
+              </a:ext>
+            </a:extLst>
+          </a:blip>
+          <a:stretch>
+            <a:fillRect/>
+          </a:stretch>
+        </p:blipFill>
+        <p:spPr>
+          <a:xfrm>
+            <a:off x="10480367" y="556927"/>
+            <a:ext cx="596056" cy="596056"/>
+          </a:xfrm>
+          <a:prstGeom prst="rect">
+            <a:avLst/>
+          </a:prstGeom>
+        </p:spPr>
+      </p:pic>
+    </p:spTree>
+    <p:extLst>
+      <p:ext uri="{BB962C8B-B14F-4D97-AF65-F5344CB8AC3E}">
+        <p14:creationId xmlns:p14="http://schemas.microsoft.com/office/powerpoint/2010/main" val="2549673406"/>
+      </p:ext>
+    </p:extLst>
+  </p:cSld>
+  <p:clrMapOvr>
+    <a:masterClrMapping/>
+  </p:clrMapOvr>
+</p:sld>
+</file>
+
+<file path=ppt/slides/slide15.xml><?xml version="1.0" encoding="utf-8"?>
+<p:sld xmlns:a="http://schemas.openxmlformats.org/drawingml/2006/main" xmlns:r="http://schemas.openxmlformats.org/officeDocument/2006/relationships" xmlns:p="http://schemas.openxmlformats.org/presentationml/2006/main">
+  <p:cSld>
+    <p:spTree>
+      <p:nvGrpSpPr>
+        <p:cNvPr id="1" name=""/>
+        <p:cNvGrpSpPr/>
+        <p:nvPr/>
+      </p:nvGrpSpPr>
+      <p:grpSpPr>
+        <a:xfrm>
+          <a:off x="0" y="0"/>
+          <a:ext cx="0" cy="0"/>
+          <a:chOff x="0" y="0"/>
+          <a:chExt cx="0" cy="0"/>
+        </a:xfrm>
+      </p:grpSpPr>
+      <p:sp>
+        <p:nvSpPr>
+          <p:cNvPr id="2" name="Titre 1"/>
+          <p:cNvSpPr>
+            <a:spLocks noGrp="1"/>
+          </p:cNvSpPr>
+          <p:nvPr>
+            <p:ph type="title"/>
+          </p:nvPr>
+        </p:nvSpPr>
+        <p:spPr/>
+        <p:txBody>
+          <a:bodyPr/>
+          <a:lstStyle/>
+          <a:p>
+            <a:pPr algn="ctr"/>
+            <a:r>
+              <a:rPr lang="fr-FR" dirty="0" err="1" smtClean="0"/>
+              <a:t>Reporting</a:t>
+            </a:r>
+            <a:r>
+              <a:rPr lang="fr-FR" dirty="0" smtClean="0"/>
+              <a:t> individuel</a:t>
+            </a:r>
+            <a:endParaRPr lang="fr-FR" dirty="0"/>
+          </a:p>
+        </p:txBody>
+      </p:sp>
+      <p:sp>
+        <p:nvSpPr>
+          <p:cNvPr id="3" name="Espace réservé du contenu 2"/>
+          <p:cNvSpPr>
+            <a:spLocks noGrp="1"/>
+          </p:cNvSpPr>
+          <p:nvPr>
+            <p:ph idx="1"/>
+          </p:nvPr>
+        </p:nvSpPr>
+        <p:spPr/>
+        <p:txBody>
+          <a:bodyPr/>
+          <a:lstStyle/>
+          <a:p>
+            <a:endParaRPr lang="fr-FR" dirty="0" smtClean="0"/>
+          </a:p>
+          <a:p>
+            <a:r>
+              <a:rPr lang="fr-FR" dirty="0" smtClean="0"/>
+              <a:t>Complétion document </a:t>
+            </a:r>
+            <a:r>
+              <a:rPr lang="fr-FR" dirty="0" err="1" smtClean="0"/>
+              <a:t>Itipédia</a:t>
+            </a:r>
+            <a:r>
+              <a:rPr lang="fr-FR" dirty="0" smtClean="0"/>
+              <a:t> avant chaque réunion hebdomadaire</a:t>
+            </a:r>
+          </a:p>
+          <a:p>
+            <a:pPr lvl="1"/>
+            <a:r>
+              <a:rPr lang="fr-FR" dirty="0" smtClean="0"/>
+              <a:t>Tâches effectuées ou avancement de la tâche</a:t>
+            </a:r>
+          </a:p>
+          <a:p>
+            <a:pPr lvl="1"/>
+            <a:r>
+              <a:rPr lang="fr-FR" dirty="0" smtClean="0"/>
+              <a:t>Estimation de la durée restante de la tâche</a:t>
+            </a:r>
+          </a:p>
+          <a:p>
+            <a:pPr lvl="1"/>
+            <a:r>
+              <a:rPr lang="fr-FR" dirty="0" smtClean="0"/>
+              <a:t>Corrélation avec le planning</a:t>
+            </a:r>
+          </a:p>
+          <a:p>
+            <a:pPr lvl="1"/>
+            <a:r>
+              <a:rPr lang="fr-FR" dirty="0" smtClean="0"/>
+              <a:t>Difficultés rencontrées</a:t>
+            </a:r>
+          </a:p>
+          <a:p>
+            <a:pPr lvl="1"/>
+            <a:endParaRPr lang="fr-FR" dirty="0" smtClean="0"/>
+          </a:p>
+          <a:p>
+            <a:r>
+              <a:rPr lang="fr-FR" dirty="0" smtClean="0"/>
+              <a:t>Avancement global projet</a:t>
+            </a:r>
+            <a:endParaRPr lang="fr-FR" dirty="0"/>
+          </a:p>
+        </p:txBody>
+      </p:sp>
+      <p:pic>
+        <p:nvPicPr>
+          <p:cNvPr id="4" name="Image 3"/>
+          <p:cNvPicPr>
+            <a:picLocks noChangeAspect="1"/>
+          </p:cNvPicPr>
+          <p:nvPr/>
+        </p:nvPicPr>
+        <p:blipFill>
+          <a:blip r:embed="rId2">
+            <a:extLst>
+              <a:ext uri="{28A0092B-C50C-407E-A947-70E740481C1C}">
+                <a14:useLocalDpi xmlns:a14="http://schemas.microsoft.com/office/drawing/2010/main" val="0"/>
+              </a:ext>
+            </a:extLst>
+          </a:blip>
+          <a:stretch>
+            <a:fillRect/>
+          </a:stretch>
+        </p:blipFill>
+        <p:spPr>
+          <a:xfrm>
+            <a:off x="10480367" y="556927"/>
+            <a:ext cx="596056" cy="596056"/>
+          </a:xfrm>
+          <a:prstGeom prst="rect">
+            <a:avLst/>
+          </a:prstGeom>
+        </p:spPr>
+      </p:pic>
+    </p:spTree>
+    <p:extLst>
+      <p:ext uri="{BB962C8B-B14F-4D97-AF65-F5344CB8AC3E}">
+        <p14:creationId xmlns:p14="http://schemas.microsoft.com/office/powerpoint/2010/main" val="145690188"/>
+      </p:ext>
+    </p:extLst>
+  </p:cSld>
+  <p:clrMapOvr>
+    <a:masterClrMapping/>
+  </p:clrMapOvr>
+</p:sld>
+</file>
+
+<file path=ppt/slides/slide16.xml><?xml version="1.0" encoding="utf-8"?>
+<p:sld xmlns:a="http://schemas.openxmlformats.org/drawingml/2006/main" xmlns:r="http://schemas.openxmlformats.org/officeDocument/2006/relationships" xmlns:p="http://schemas.openxmlformats.org/presentationml/2006/main">
+  <p:cSld>
+    <p:spTree>
+      <p:nvGrpSpPr>
+        <p:cNvPr id="1" name=""/>
+        <p:cNvGrpSpPr/>
+        <p:nvPr/>
+      </p:nvGrpSpPr>
+      <p:grpSpPr>
+        <a:xfrm>
+          <a:off x="0" y="0"/>
+          <a:ext cx="0" cy="0"/>
+          <a:chOff x="0" y="0"/>
+          <a:chExt cx="0" cy="0"/>
+        </a:xfrm>
+      </p:grpSpPr>
+      <p:sp>
+        <p:nvSpPr>
+          <p:cNvPr id="2" name="Titre 1"/>
+          <p:cNvSpPr>
+            <a:spLocks noGrp="1"/>
+          </p:cNvSpPr>
+          <p:nvPr>
+            <p:ph type="title"/>
+          </p:nvPr>
+        </p:nvSpPr>
+        <p:spPr/>
+        <p:txBody>
+          <a:bodyPr/>
+          <a:lstStyle/>
+          <a:p>
+            <a:pPr algn="ctr"/>
+            <a:r>
+              <a:rPr lang="fr-FR" dirty="0" smtClean="0"/>
+              <a:t>Relations parties prenantes</a:t>
+            </a:r>
+            <a:endParaRPr lang="fr-FR" dirty="0"/>
+          </a:p>
+        </p:txBody>
+      </p:sp>
+      <p:sp>
+        <p:nvSpPr>
+          <p:cNvPr id="3" name="Espace réservé du contenu 2"/>
+          <p:cNvSpPr>
+            <a:spLocks noGrp="1"/>
+          </p:cNvSpPr>
+          <p:nvPr>
+            <p:ph idx="1"/>
+          </p:nvPr>
+        </p:nvSpPr>
+        <p:spPr/>
+        <p:txBody>
+          <a:bodyPr/>
+          <a:lstStyle/>
+          <a:p>
+            <a:r>
+              <a:rPr lang="fr-FR" dirty="0" smtClean="0"/>
+              <a:t>Équipe &amp; chef de projet</a:t>
+            </a:r>
+          </a:p>
+          <a:p>
+            <a:pPr lvl="1"/>
+            <a:r>
+              <a:rPr lang="fr-FR" dirty="0" smtClean="0"/>
+              <a:t>Travail en équipe</a:t>
+            </a:r>
+          </a:p>
+          <a:p>
+            <a:pPr lvl="1"/>
+            <a:r>
+              <a:rPr lang="fr-FR" dirty="0" smtClean="0"/>
+              <a:t>Stand-up meeting</a:t>
+            </a:r>
+          </a:p>
+          <a:p>
+            <a:pPr lvl="1"/>
+            <a:r>
+              <a:rPr lang="fr-FR" dirty="0" smtClean="0"/>
+              <a:t>Mail, </a:t>
+            </a:r>
+            <a:r>
+              <a:rPr lang="fr-FR" dirty="0" err="1" smtClean="0"/>
+              <a:t>sms</a:t>
+            </a:r>
+            <a:r>
+              <a:rPr lang="fr-FR" dirty="0" smtClean="0"/>
+              <a:t>, Skype, </a:t>
+            </a:r>
+            <a:r>
+              <a:rPr lang="fr-FR" dirty="0" err="1" smtClean="0"/>
+              <a:t>GitHub</a:t>
+            </a:r>
+            <a:endParaRPr lang="fr-FR" dirty="0" smtClean="0"/>
+          </a:p>
+          <a:p>
+            <a:pPr lvl="1"/>
+            <a:endParaRPr lang="fr-FR" dirty="0"/>
+          </a:p>
+          <a:p>
+            <a:r>
+              <a:rPr lang="fr-FR" dirty="0" smtClean="0"/>
+              <a:t>Équipe &amp; client</a:t>
+            </a:r>
+          </a:p>
+          <a:p>
+            <a:pPr lvl="1"/>
+            <a:r>
+              <a:rPr lang="fr-FR" dirty="0" smtClean="0"/>
+              <a:t>Réunion hebdomadaire</a:t>
+            </a:r>
+          </a:p>
+          <a:p>
+            <a:pPr lvl="1"/>
+            <a:r>
+              <a:rPr lang="fr-FR" dirty="0" smtClean="0"/>
+              <a:t>Envoi </a:t>
+            </a:r>
+            <a:r>
+              <a:rPr lang="fr-FR" dirty="0" smtClean="0"/>
+              <a:t>ordre du jour, prise de notes, rédaction compte-rendu</a:t>
+            </a:r>
+          </a:p>
+          <a:p>
+            <a:pPr lvl="1"/>
+            <a:r>
+              <a:rPr lang="fr-FR" dirty="0" smtClean="0"/>
+              <a:t>Page </a:t>
+            </a:r>
+            <a:r>
+              <a:rPr lang="fr-FR" dirty="0" err="1" smtClean="0"/>
+              <a:t>itipédia</a:t>
+            </a:r>
+            <a:r>
+              <a:rPr lang="fr-FR" dirty="0" smtClean="0"/>
+              <a:t>, suivi et remarque client</a:t>
+            </a:r>
+            <a:endParaRPr lang="fr-FR" dirty="0"/>
+          </a:p>
+        </p:txBody>
+      </p:sp>
+      <p:pic>
+        <p:nvPicPr>
+          <p:cNvPr id="4" name="Image 3"/>
+          <p:cNvPicPr>
+            <a:picLocks noChangeAspect="1"/>
+          </p:cNvPicPr>
+          <p:nvPr/>
+        </p:nvPicPr>
+        <p:blipFill>
+          <a:blip r:embed="rId2">
+            <a:extLst>
+              <a:ext uri="{28A0092B-C50C-407E-A947-70E740481C1C}">
+                <a14:useLocalDpi xmlns:a14="http://schemas.microsoft.com/office/drawing/2010/main" val="0"/>
+              </a:ext>
+            </a:extLst>
+          </a:blip>
+          <a:stretch>
+            <a:fillRect/>
+          </a:stretch>
+        </p:blipFill>
+        <p:spPr>
+          <a:xfrm>
+            <a:off x="10480367" y="556927"/>
+            <a:ext cx="596056" cy="596056"/>
+          </a:xfrm>
+          <a:prstGeom prst="rect">
+            <a:avLst/>
+          </a:prstGeom>
+        </p:spPr>
+      </p:pic>
+    </p:spTree>
+    <p:extLst>
+      <p:ext uri="{BB962C8B-B14F-4D97-AF65-F5344CB8AC3E}">
+        <p14:creationId xmlns:p14="http://schemas.microsoft.com/office/powerpoint/2010/main" val="2160293929"/>
+      </p:ext>
+    </p:extLst>
+  </p:cSld>
+  <p:clrMapOvr>
+    <a:masterClrMapping/>
+  </p:clrMapOvr>
+</p:sld>
+</file>
+
+<file path=ppt/slides/slide17.xml><?xml version="1.0" encoding="utf-8"?>
+<p:sld xmlns:a="http://schemas.openxmlformats.org/drawingml/2006/main" xmlns:r="http://schemas.openxmlformats.org/officeDocument/2006/relationships" xmlns:p="http://schemas.openxmlformats.org/presentationml/2006/main">
+  <p:cSld>
+    <p:spTree>
+      <p:nvGrpSpPr>
+        <p:cNvPr id="1" name=""/>
+        <p:cNvGrpSpPr/>
+        <p:nvPr/>
+      </p:nvGrpSpPr>
+      <p:grpSpPr>
+        <a:xfrm>
+          <a:off x="0" y="0"/>
+          <a:ext cx="0" cy="0"/>
+          <a:chOff x="0" y="0"/>
+          <a:chExt cx="0" cy="0"/>
+        </a:xfrm>
+      </p:grpSpPr>
+      <p:sp>
+        <p:nvSpPr>
+          <p:cNvPr id="2" name="Titre 1"/>
+          <p:cNvSpPr>
+            <a:spLocks noGrp="1"/>
+          </p:cNvSpPr>
+          <p:nvPr>
+            <p:ph type="title"/>
+          </p:nvPr>
+        </p:nvSpPr>
+        <p:spPr/>
+        <p:txBody>
+          <a:bodyPr/>
+          <a:lstStyle/>
+          <a:p>
+            <a:pPr algn="ctr"/>
+            <a:r>
+              <a:rPr lang="fr-FR" dirty="0" smtClean="0"/>
+              <a:t>Livrables</a:t>
+            </a:r>
+            <a:endParaRPr lang="fr-FR" dirty="0"/>
+          </a:p>
+        </p:txBody>
+      </p:sp>
+      <p:sp>
+        <p:nvSpPr>
+          <p:cNvPr id="3" name="Espace réservé du contenu 2"/>
+          <p:cNvSpPr>
+            <a:spLocks noGrp="1"/>
+          </p:cNvSpPr>
+          <p:nvPr>
+            <p:ph idx="1"/>
+          </p:nvPr>
+        </p:nvSpPr>
+        <p:spPr/>
+        <p:txBody>
+          <a:bodyPr>
+            <a:normAutofit fontScale="92500" lnSpcReduction="10000"/>
+          </a:bodyPr>
+          <a:lstStyle/>
+          <a:p>
+            <a:r>
+              <a:rPr lang="fr-FR" dirty="0" smtClean="0"/>
+              <a:t>Documents avant-projet</a:t>
+            </a:r>
+          </a:p>
+          <a:p>
+            <a:pPr lvl="1"/>
+            <a:r>
+              <a:rPr lang="fr-FR" dirty="0" smtClean="0"/>
+              <a:t>Envoi forme électronique</a:t>
+            </a:r>
+          </a:p>
+          <a:p>
+            <a:pPr lvl="1"/>
+            <a:endParaRPr lang="fr-FR" dirty="0"/>
+          </a:p>
+          <a:p>
+            <a:r>
+              <a:rPr lang="fr-FR" dirty="0" smtClean="0"/>
+              <a:t>Informations IN’TECHOES</a:t>
+            </a:r>
+          </a:p>
+          <a:p>
+            <a:pPr lvl="1"/>
+            <a:r>
+              <a:rPr lang="fr-FR" dirty="0" smtClean="0"/>
+              <a:t>Envoi forme électronique</a:t>
+            </a:r>
+          </a:p>
+          <a:p>
+            <a:pPr lvl="1"/>
+            <a:endParaRPr lang="fr-FR" dirty="0"/>
+          </a:p>
+          <a:p>
+            <a:r>
+              <a:rPr lang="fr-FR" dirty="0" smtClean="0"/>
+              <a:t>Manuel d’utilisation</a:t>
+            </a:r>
+          </a:p>
+          <a:p>
+            <a:pPr lvl="1"/>
+            <a:r>
+              <a:rPr lang="fr-FR" dirty="0" smtClean="0"/>
+              <a:t>Avec le code source</a:t>
+            </a:r>
+          </a:p>
+          <a:p>
+            <a:endParaRPr lang="fr-FR" dirty="0"/>
+          </a:p>
+          <a:p>
+            <a:r>
+              <a:rPr lang="fr-FR" dirty="0" smtClean="0"/>
+              <a:t>Documents utiles </a:t>
+            </a:r>
+            <a:r>
+              <a:rPr lang="fr-FR" dirty="0" err="1" smtClean="0"/>
+              <a:t>com</a:t>
+            </a:r>
+            <a:r>
+              <a:rPr lang="fr-FR" dirty="0" smtClean="0"/>
+              <a:t>’ ESIEA</a:t>
+            </a:r>
+          </a:p>
+          <a:p>
+            <a:pPr lvl="1"/>
+            <a:r>
+              <a:rPr lang="fr-FR" dirty="0" smtClean="0"/>
+              <a:t>Envoi forme électronique</a:t>
+            </a:r>
+            <a:endParaRPr lang="fr-FR" dirty="0"/>
+          </a:p>
+        </p:txBody>
+      </p:sp>
+      <p:pic>
+        <p:nvPicPr>
+          <p:cNvPr id="4" name="Image 3"/>
+          <p:cNvPicPr>
+            <a:picLocks noChangeAspect="1"/>
+          </p:cNvPicPr>
+          <p:nvPr/>
+        </p:nvPicPr>
+        <p:blipFill>
+          <a:blip r:embed="rId2">
+            <a:extLst>
+              <a:ext uri="{28A0092B-C50C-407E-A947-70E740481C1C}">
+                <a14:useLocalDpi xmlns:a14="http://schemas.microsoft.com/office/drawing/2010/main" val="0"/>
+              </a:ext>
+            </a:extLst>
+          </a:blip>
+          <a:stretch>
+            <a:fillRect/>
+          </a:stretch>
+        </p:blipFill>
+        <p:spPr>
+          <a:xfrm>
+            <a:off x="10480367" y="556927"/>
+            <a:ext cx="596056" cy="596056"/>
+          </a:xfrm>
+          <a:prstGeom prst="rect">
+            <a:avLst/>
+          </a:prstGeom>
+        </p:spPr>
+      </p:pic>
+    </p:spTree>
+    <p:extLst>
+      <p:ext uri="{BB962C8B-B14F-4D97-AF65-F5344CB8AC3E}">
+        <p14:creationId xmlns:p14="http://schemas.microsoft.com/office/powerpoint/2010/main" val="3887596506"/>
+      </p:ext>
+    </p:extLst>
+  </p:cSld>
+  <p:clrMapOvr>
+    <a:masterClrMapping/>
+  </p:clrMapOvr>
+</p:sld>
+</file>
+
+<file path=ppt/slides/slide18.xml><?xml version="1.0" encoding="utf-8"?>
+<p:sld xmlns:a="http://schemas.openxmlformats.org/drawingml/2006/main" xmlns:r="http://schemas.openxmlformats.org/officeDocument/2006/relationships" xmlns:p="http://schemas.openxmlformats.org/presentationml/2006/main">
+  <p:cSld>
+    <p:spTree>
+      <p:nvGrpSpPr>
+        <p:cNvPr id="1" name=""/>
+        <p:cNvGrpSpPr/>
+        <p:nvPr/>
+      </p:nvGrpSpPr>
+      <p:grpSpPr>
+        <a:xfrm>
+          <a:off x="0" y="0"/>
+          <a:ext cx="0" cy="0"/>
+          <a:chOff x="0" y="0"/>
+          <a:chExt cx="0" cy="0"/>
+        </a:xfrm>
+      </p:grpSpPr>
+      <p:sp>
+        <p:nvSpPr>
+          <p:cNvPr id="2" name="Titre 1"/>
+          <p:cNvSpPr>
+            <a:spLocks noGrp="1"/>
+          </p:cNvSpPr>
+          <p:nvPr>
+            <p:ph type="title"/>
+          </p:nvPr>
+        </p:nvSpPr>
+        <p:spPr/>
+        <p:txBody>
+          <a:bodyPr/>
+          <a:lstStyle/>
+          <a:p>
+            <a:pPr algn="ctr"/>
+            <a:r>
+              <a:rPr lang="fr-FR" dirty="0" smtClean="0"/>
+              <a:t>Planning</a:t>
+            </a:r>
+            <a:endParaRPr lang="fr-FR" dirty="0"/>
+          </a:p>
+        </p:txBody>
+      </p:sp>
+      <p:sp>
+        <p:nvSpPr>
+          <p:cNvPr id="3" name="Espace réservé du contenu 2"/>
+          <p:cNvSpPr>
+            <a:spLocks noGrp="1"/>
+          </p:cNvSpPr>
+          <p:nvPr>
+            <p:ph idx="1"/>
+          </p:nvPr>
+        </p:nvSpPr>
+        <p:spPr/>
+        <p:txBody>
+          <a:bodyPr/>
+          <a:lstStyle/>
+          <a:p>
+            <a:r>
+              <a:rPr lang="fr-FR" dirty="0" smtClean="0"/>
+              <a:t>Sous </a:t>
+            </a:r>
+            <a:r>
+              <a:rPr lang="fr-FR" dirty="0" err="1" smtClean="0"/>
+              <a:t>Gantter</a:t>
+            </a:r>
+            <a:endParaRPr lang="fr-FR" dirty="0"/>
+          </a:p>
+        </p:txBody>
+      </p:sp>
+      <p:pic>
+        <p:nvPicPr>
+          <p:cNvPr id="4" name="Image 3"/>
+          <p:cNvPicPr>
+            <a:picLocks noChangeAspect="1"/>
+          </p:cNvPicPr>
+          <p:nvPr/>
+        </p:nvPicPr>
+        <p:blipFill>
+          <a:blip r:embed="rId2">
+            <a:extLst>
+              <a:ext uri="{28A0092B-C50C-407E-A947-70E740481C1C}">
+                <a14:useLocalDpi xmlns:a14="http://schemas.microsoft.com/office/drawing/2010/main" val="0"/>
+              </a:ext>
+            </a:extLst>
+          </a:blip>
+          <a:stretch>
+            <a:fillRect/>
+          </a:stretch>
+        </p:blipFill>
+        <p:spPr>
+          <a:xfrm>
+            <a:off x="10480367" y="556927"/>
+            <a:ext cx="596056" cy="596056"/>
+          </a:xfrm>
+          <a:prstGeom prst="rect">
+            <a:avLst/>
+          </a:prstGeom>
+        </p:spPr>
+      </p:pic>
+    </p:spTree>
+    <p:extLst>
+      <p:ext uri="{BB962C8B-B14F-4D97-AF65-F5344CB8AC3E}">
+        <p14:creationId xmlns:p14="http://schemas.microsoft.com/office/powerpoint/2010/main" val="1290910678"/>
+      </p:ext>
+    </p:extLst>
+  </p:cSld>
+  <p:clrMapOvr>
+    <a:masterClrMapping/>
+  </p:clrMapOvr>
+  <p:timing>
+    <p:tnLst>
+      <p:par>
+        <p:cTn id="1" dur="indefinite" restart="never" nodeType="tmRoot"/>
+      </p:par>
+    </p:tnLst>
+  </p:timing>
+</p:sld>
+</file>
+
+<file path=ppt/slides/slide19.xml><?xml version="1.0" encoding="utf-8"?>
+<p:sld xmlns:a="http://schemas.openxmlformats.org/drawingml/2006/main" xmlns:r="http://schemas.openxmlformats.org/officeDocument/2006/relationships" xmlns:p="http://schemas.openxmlformats.org/presentationml/2006/main">
+  <p:cSld>
+    <p:spTree>
+      <p:nvGrpSpPr>
+        <p:cNvPr id="1" name=""/>
+        <p:cNvGrpSpPr/>
+        <p:nvPr/>
+      </p:nvGrpSpPr>
+      <p:grpSpPr>
+        <a:xfrm>
+          <a:off x="0" y="0"/>
+          <a:ext cx="0" cy="0"/>
+          <a:chOff x="0" y="0"/>
+          <a:chExt cx="0" cy="0"/>
+        </a:xfrm>
+      </p:grpSpPr>
+      <p:sp>
+        <p:nvSpPr>
+          <p:cNvPr id="2" name="Titre 1"/>
+          <p:cNvSpPr>
+            <a:spLocks noGrp="1"/>
+          </p:cNvSpPr>
+          <p:nvPr>
+            <p:ph type="title"/>
+          </p:nvPr>
+        </p:nvSpPr>
+        <p:spPr/>
+        <p:txBody>
+          <a:bodyPr/>
+          <a:lstStyle/>
+          <a:p>
+            <a:pPr algn="ctr"/>
+            <a:r>
+              <a:rPr lang="fr-FR" dirty="0" smtClean="0"/>
+              <a:t>Avez-vous des questions?</a:t>
+            </a:r>
+            <a:endParaRPr lang="fr-FR" dirty="0"/>
+          </a:p>
+        </p:txBody>
+      </p:sp>
+      <p:pic>
+        <p:nvPicPr>
+          <p:cNvPr id="4" name="Image 3"/>
+          <p:cNvPicPr>
+            <a:picLocks noChangeAspect="1"/>
+          </p:cNvPicPr>
+          <p:nvPr/>
+        </p:nvPicPr>
+        <p:blipFill>
+          <a:blip r:embed="rId2">
+            <a:extLst>
+              <a:ext uri="{28A0092B-C50C-407E-A947-70E740481C1C}">
+                <a14:useLocalDpi xmlns:a14="http://schemas.microsoft.com/office/drawing/2010/main" val="0"/>
+              </a:ext>
+            </a:extLst>
+          </a:blip>
+          <a:stretch>
+            <a:fillRect/>
+          </a:stretch>
+        </p:blipFill>
+        <p:spPr>
+          <a:xfrm>
+            <a:off x="10480367" y="556927"/>
+            <a:ext cx="596056" cy="596056"/>
+          </a:xfrm>
+          <a:prstGeom prst="rect">
+            <a:avLst/>
+          </a:prstGeom>
+        </p:spPr>
+      </p:pic>
+      <p:pic>
+        <p:nvPicPr>
+          <p:cNvPr id="5" name="Image 4"/>
+          <p:cNvPicPr>
+            <a:picLocks noChangeAspect="1"/>
+          </p:cNvPicPr>
+          <p:nvPr/>
+        </p:nvPicPr>
+        <p:blipFill>
+          <a:blip r:embed="rId2">
+            <a:extLst>
+              <a:ext uri="{28A0092B-C50C-407E-A947-70E740481C1C}">
+                <a14:useLocalDpi xmlns:a14="http://schemas.microsoft.com/office/drawing/2010/main" val="0"/>
+              </a:ext>
+            </a:extLst>
+          </a:blip>
+          <a:stretch>
+            <a:fillRect/>
+          </a:stretch>
+        </p:blipFill>
+        <p:spPr>
+          <a:xfrm>
+            <a:off x="4530435" y="2519686"/>
+            <a:ext cx="2744634" cy="2744634"/>
+          </a:xfrm>
+          <a:prstGeom prst="rect">
+            <a:avLst/>
+          </a:prstGeom>
+        </p:spPr>
+      </p:pic>
+    </p:spTree>
+    <p:extLst>
+      <p:ext uri="{BB962C8B-B14F-4D97-AF65-F5344CB8AC3E}">
+        <p14:creationId xmlns:p14="http://schemas.microsoft.com/office/powerpoint/2010/main" val="2293112728"/>
+      </p:ext>
+    </p:extLst>
+  </p:cSld>
+  <p:clrMapOvr>
+    <a:masterClrMapping/>
+  </p:clrMapOvr>
+  <p:timing>
+    <p:tnLst>
+      <p:par>
+        <p:cTn id="1" dur="indefinite" restart="never" nodeType="tmRoot"/>
+      </p:par>
+    </p:tnLst>
+  </p:timing>
+</p:sld>
+</file>
+
 <file path=ppt/slides/slide2.xml><?xml version="1.0" encoding="utf-8"?>
 <p:sld xmlns:a="http://schemas.openxmlformats.org/drawingml/2006/main" xmlns:r="http://schemas.openxmlformats.org/officeDocument/2006/relationships" xmlns:p="http://schemas.openxmlformats.org/presentationml/2006/main">
   <p:cSld>
@@ -6220,6 +7751,9 @@
           <a:bodyPr/>
           <a:lstStyle/>
           <a:p>
+            <a:endParaRPr lang="fr-FR" dirty="0" smtClean="0"/>
+          </a:p>
+          <a:p>
             <a:r>
               <a:rPr lang="fr-FR" dirty="0" smtClean="0"/>
               <a:t>Chef de projet: </a:t>
@@ -6238,7 +7772,7 @@
           <a:p>
             <a:r>
               <a:rPr lang="fr-FR" dirty="0" smtClean="0"/>
-              <a:t>Membre de l’équipe :</a:t>
+              <a:t>Membres de l’équipe :</a:t>
             </a:r>
           </a:p>
           <a:p>
@@ -6264,14 +7798,40 @@
           </a:p>
           <a:p>
             <a:pPr lvl="1"/>
-            <a:r>
-              <a:rPr lang="fr-FR" dirty="0" smtClean="0"/>
-              <a:t>Alban INQUEL</a:t>
-            </a:r>
             <a:endParaRPr lang="fr-FR" dirty="0"/>
           </a:p>
         </p:txBody>
       </p:sp>
+      <p:pic>
+        <p:nvPicPr>
+          <p:cNvPr id="4" name="Image 3"/>
+          <p:cNvPicPr>
+            <a:picLocks noChangeAspect="1"/>
+          </p:cNvPicPr>
+          <p:nvPr/>
+        </p:nvPicPr>
+        <p:blipFill>
+          <a:blip r:embed="rId2">
+            <a:extLst>
+              <a:ext uri="{28A0092B-C50C-407E-A947-70E740481C1C}">
+                <a14:useLocalDpi xmlns:a14="http://schemas.microsoft.com/office/drawing/2010/main" val="0"/>
+              </a:ext>
+            </a:extLst>
+          </a:blip>
+          <a:stretch>
+            <a:fillRect/>
+          </a:stretch>
+        </p:blipFill>
+        <p:spPr>
+          <a:xfrm>
+            <a:off x="10480367" y="556927"/>
+            <a:ext cx="596056" cy="596056"/>
+          </a:xfrm>
+          <a:prstGeom prst="rect">
+            <a:avLst/>
+          </a:prstGeom>
+        </p:spPr>
+      </p:pic>
     </p:spTree>
     <p:extLst>
       <p:ext uri="{BB962C8B-B14F-4D97-AF65-F5344CB8AC3E}">
@@ -6319,8 +7879,8 @@
           <a:p>
             <a:pPr algn="ctr"/>
             <a:r>
-              <a:rPr lang="fr-FR" dirty="0" err="1" smtClean="0"/>
-              <a:t>Misssion</a:t>
+              <a:rPr lang="fr-FR" dirty="0" smtClean="0"/>
+              <a:t>Mission</a:t>
             </a:r>
             <a:endParaRPr lang="fr-FR" dirty="0"/>
           </a:p>
@@ -6380,6 +7940,36 @@
           </a:p>
         </p:txBody>
       </p:sp>
+      <p:pic>
+        <p:nvPicPr>
+          <p:cNvPr id="4" name="Image 3"/>
+          <p:cNvPicPr>
+            <a:picLocks noChangeAspect="1"/>
+          </p:cNvPicPr>
+          <p:nvPr/>
+        </p:nvPicPr>
+        <p:blipFill>
+          <a:blip r:embed="rId2">
+            <a:extLst>
+              <a:ext uri="{28A0092B-C50C-407E-A947-70E740481C1C}">
+                <a14:useLocalDpi xmlns:a14="http://schemas.microsoft.com/office/drawing/2010/main" val="0"/>
+              </a:ext>
+            </a:extLst>
+          </a:blip>
+          <a:stretch>
+            <a:fillRect/>
+          </a:stretch>
+        </p:blipFill>
+        <p:spPr>
+          <a:xfrm>
+            <a:off x="10480367" y="556927"/>
+            <a:ext cx="596056" cy="596056"/>
+          </a:xfrm>
+          <a:prstGeom prst="rect">
+            <a:avLst/>
+          </a:prstGeom>
+        </p:spPr>
+      </p:pic>
     </p:spTree>
     <p:extLst>
       <p:ext uri="{BB962C8B-B14F-4D97-AF65-F5344CB8AC3E}">
@@ -6451,21 +8041,30 @@
           </a:bodyPr>
           <a:lstStyle/>
           <a:p>
-            <a:pPr lvl="0"/>
+            <a:pPr marL="457200" lvl="0" indent="-457200">
+              <a:buFont typeface="+mj-lt"/>
+              <a:buAutoNum type="arabicPeriod"/>
+            </a:pPr>
             <a:r>
               <a:rPr lang="fr-FR" dirty="0"/>
               <a:t>Pouvoir scanner l’intégralité du réseau avant le 15/04.</a:t>
             </a:r>
           </a:p>
           <a:p>
-            <a:pPr lvl="0"/>
+            <a:pPr marL="457200" lvl="0" indent="-457200">
+              <a:buFont typeface="+mj-lt"/>
+              <a:buAutoNum type="arabicPeriod"/>
+            </a:pPr>
             <a:r>
               <a:rPr lang="fr-FR" dirty="0"/>
               <a:t>Pouvoir modifier la table ARP à distance avant le 22/04.</a:t>
             </a:r>
           </a:p>
           <a:p>
-            <a:pPr lvl="0"/>
+            <a:pPr marL="457200" lvl="0" indent="-457200">
+              <a:buFont typeface="+mj-lt"/>
+              <a:buAutoNum type="arabicPeriod"/>
+            </a:pPr>
             <a:r>
               <a:rPr lang="fr-FR" dirty="0"/>
               <a:t>Pouvoir intercepter et </a:t>
@@ -6480,42 +8079,60 @@
             </a:r>
           </a:p>
           <a:p>
-            <a:pPr lvl="0"/>
+            <a:pPr marL="457200" lvl="0" indent="-457200">
+              <a:buFont typeface="+mj-lt"/>
+              <a:buAutoNum type="arabicPeriod"/>
+            </a:pPr>
             <a:r>
               <a:rPr lang="fr-FR" dirty="0"/>
               <a:t>Création d’une interface graphique avant le 03/05.</a:t>
             </a:r>
           </a:p>
           <a:p>
-            <a:pPr lvl="0"/>
+            <a:pPr marL="457200" lvl="0" indent="-457200">
+              <a:buFont typeface="+mj-lt"/>
+              <a:buAutoNum type="arabicPeriod"/>
+            </a:pPr>
             <a:r>
               <a:rPr lang="fr-FR" dirty="0"/>
               <a:t>Pouvoir obtenir les mots de passe transitant en clair avant le 06/05.</a:t>
             </a:r>
           </a:p>
           <a:p>
-            <a:pPr lvl="0"/>
+            <a:pPr marL="457200" lvl="0" indent="-457200">
+              <a:buFont typeface="+mj-lt"/>
+              <a:buAutoNum type="arabicPeriod"/>
+            </a:pPr>
             <a:r>
               <a:rPr lang="fr-FR" dirty="0"/>
               <a:t>Pouvoir modifier les réponses DNS avant le 15/05.</a:t>
             </a:r>
           </a:p>
           <a:p>
-            <a:pPr lvl="0"/>
+            <a:pPr marL="457200" lvl="0" indent="-457200">
+              <a:buFont typeface="+mj-lt"/>
+              <a:buAutoNum type="arabicPeriod"/>
+            </a:pPr>
             <a:r>
               <a:rPr lang="fr-FR" dirty="0"/>
               <a:t>Pouvoir intégrer les cookies de la « victime » automatiquement sur la machine attaquante avant le 23/05.</a:t>
             </a:r>
           </a:p>
           <a:p>
-            <a:pPr lvl="0"/>
+            <a:pPr marL="457200" lvl="0" indent="-457200">
+              <a:buFont typeface="+mj-lt"/>
+              <a:buAutoNum type="arabicPeriod"/>
+            </a:pPr>
             <a:r>
               <a:rPr lang="fr-FR" dirty="0"/>
               <a:t>Affichage des pages web visitées avant le 30/05.</a:t>
             </a:r>
           </a:p>
           <a:p>
-            <a:pPr lvl="0"/>
+            <a:pPr marL="457200" lvl="0" indent="-457200">
+              <a:buFont typeface="+mj-lt"/>
+              <a:buAutoNum type="arabicPeriod"/>
+            </a:pPr>
             <a:r>
               <a:rPr lang="fr-FR" dirty="0"/>
               <a:t>Pouvoir intercepter les transmissions </a:t>
@@ -6530,7 +8147,10 @@
             </a:r>
           </a:p>
           <a:p>
-            <a:pPr lvl="0"/>
+            <a:pPr marL="457200" lvl="0" indent="-457200">
+              <a:buFont typeface="+mj-lt"/>
+              <a:buAutoNum type="arabicPeriod"/>
+            </a:pPr>
             <a:r>
               <a:rPr lang="fr-FR" dirty="0"/>
               <a:t>Pouvoir générer de faux certificats automatiquement avant le 13/06.</a:t>
@@ -6631,6 +8251,11 @@
           <a:bodyPr/>
           <a:lstStyle/>
           <a:p>
+            <a:pPr algn="ctr"/>
+            <a:r>
+              <a:rPr lang="fr-FR" dirty="0" smtClean="0"/>
+              <a:t>Périmètre</a:t>
+            </a:r>
             <a:endParaRPr lang="fr-FR" dirty="0"/>
           </a:p>
         </p:txBody>
@@ -6650,10 +8275,87 @@
           <a:bodyPr/>
           <a:lstStyle/>
           <a:p>
+            <a:endParaRPr lang="fr-FR" dirty="0" smtClean="0"/>
+          </a:p>
+          <a:p>
+            <a:r>
+              <a:rPr lang="fr-FR" dirty="0" smtClean="0"/>
+              <a:t>Interception de nombreux protocoles par ARP spoofing</a:t>
+            </a:r>
+          </a:p>
+          <a:p>
+            <a:r>
+              <a:rPr lang="fr-FR" dirty="0" smtClean="0"/>
+              <a:t>Utilisation de librairies Perl :</a:t>
+            </a:r>
+          </a:p>
+          <a:p>
+            <a:pPr lvl="1"/>
+            <a:r>
+              <a:rPr lang="fr-FR" dirty="0" smtClean="0"/>
+              <a:t>Aspect graphique</a:t>
+            </a:r>
+          </a:p>
+          <a:p>
+            <a:pPr lvl="1"/>
+            <a:r>
+              <a:rPr lang="fr-FR" dirty="0" smtClean="0"/>
+              <a:t>Capture de paquets sur le réseau</a:t>
+            </a:r>
+          </a:p>
+          <a:p>
+            <a:pPr lvl="1"/>
+            <a:r>
+              <a:rPr lang="fr-FR" dirty="0" smtClean="0"/>
+              <a:t>Interception communication VoIP</a:t>
+            </a:r>
             <a:endParaRPr lang="fr-FR" dirty="0"/>
           </a:p>
-        </p:txBody>
-      </p:sp>
+          <a:p>
+            <a:r>
+              <a:rPr lang="fr-FR" dirty="0" smtClean="0"/>
+              <a:t>Affichage page web sur Webkit</a:t>
+            </a:r>
+          </a:p>
+          <a:p>
+            <a:r>
+              <a:rPr lang="fr-FR" dirty="0" smtClean="0"/>
+              <a:t>Génération faux certificats openCA</a:t>
+            </a:r>
+            <a:endParaRPr lang="fr-FR" dirty="0"/>
+          </a:p>
+        </p:txBody>
+      </p:sp>
+      <p:pic>
+        <p:nvPicPr>
+          <p:cNvPr id="4" name="Image 3"/>
+          <p:cNvPicPr>
+            <a:picLocks noChangeAspect="1"/>
+          </p:cNvPicPr>
+          <p:nvPr/>
+        </p:nvPicPr>
+        <p:blipFill>
+          <a:blip r:embed="rId2">
+            <a:extLst>
+              <a:ext uri="{28A0092B-C50C-407E-A947-70E740481C1C}">
+                <a14:useLocalDpi xmlns:a14="http://schemas.microsoft.com/office/drawing/2010/main" val="0"/>
+              </a:ext>
+            </a:extLst>
+          </a:blip>
+          <a:stretch>
+            <a:fillRect/>
+          </a:stretch>
+        </p:blipFill>
+        <p:spPr>
+          <a:xfrm>
+            <a:off x="10480367" y="556927"/>
+            <a:ext cx="596056" cy="596056"/>
+          </a:xfrm>
+          <a:prstGeom prst="rect">
+            <a:avLst/>
+          </a:prstGeom>
+        </p:spPr>
+      </p:pic>
     </p:spTree>
     <p:extLst>
       <p:ext uri="{BB962C8B-B14F-4D97-AF65-F5344CB8AC3E}">
@@ -6699,7 +8401,12 @@
           <a:bodyPr/>
           <a:lstStyle/>
           <a:p>
-            <a:endParaRPr lang="fr-FR"/>
+            <a:pPr algn="ctr"/>
+            <a:r>
+              <a:rPr lang="fr-FR" dirty="0" smtClean="0"/>
+              <a:t>Existant</a:t>
+            </a:r>
+            <a:endParaRPr lang="fr-FR" dirty="0"/>
           </a:p>
         </p:txBody>
       </p:sp>
@@ -6718,10 +8425,88 @@
           <a:bodyPr/>
           <a:lstStyle/>
           <a:p>
-            <a:endParaRPr lang="fr-FR"/>
-          </a:p>
-        </p:txBody>
-      </p:sp>
+            <a:endParaRPr lang="fr-FR" dirty="0" smtClean="0"/>
+          </a:p>
+          <a:p>
+            <a:r>
+              <a:rPr lang="fr-FR" dirty="0" smtClean="0"/>
+              <a:t>Logiciels « couteaux suisses » :</a:t>
+            </a:r>
+          </a:p>
+          <a:p>
+            <a:pPr lvl="1"/>
+            <a:r>
+              <a:rPr lang="fr-FR" dirty="0" smtClean="0"/>
+              <a:t>Cain &amp; Abel</a:t>
+            </a:r>
+          </a:p>
+          <a:p>
+            <a:pPr lvl="1"/>
+            <a:r>
+              <a:rPr lang="fr-FR" dirty="0" smtClean="0"/>
+              <a:t>Ettercap</a:t>
+            </a:r>
+          </a:p>
+          <a:p>
+            <a:endParaRPr lang="fr-FR" dirty="0"/>
+          </a:p>
+          <a:p>
+            <a:r>
+              <a:rPr lang="fr-FR" dirty="0" smtClean="0"/>
+              <a:t>SITM plus spécifique :</a:t>
+            </a:r>
+            <a:r>
+              <a:rPr lang="fr-FR" dirty="0"/>
+              <a:t> </a:t>
+            </a:r>
+            <a:endParaRPr lang="fr-FR" dirty="0" smtClean="0"/>
+          </a:p>
+          <a:p>
+            <a:pPr lvl="1"/>
+            <a:r>
+              <a:rPr lang="fr-FR" dirty="0" smtClean="0"/>
+              <a:t>Visualisation pages visitées</a:t>
+            </a:r>
+          </a:p>
+          <a:p>
+            <a:pPr lvl="1"/>
+            <a:r>
+              <a:rPr lang="fr-FR" dirty="0" smtClean="0"/>
+              <a:t>Détection tentatives Man In The Middle</a:t>
+            </a:r>
+          </a:p>
+        </p:txBody>
+      </p:sp>
+      <p:pic>
+        <p:nvPicPr>
+          <p:cNvPr id="4" name="Image 3"/>
+          <p:cNvPicPr>
+            <a:picLocks noChangeAspect="1"/>
+          </p:cNvPicPr>
+          <p:nvPr/>
+        </p:nvPicPr>
+        <p:blipFill>
+          <a:blip r:embed="rId2">
+            <a:extLst>
+              <a:ext uri="{28A0092B-C50C-407E-A947-70E740481C1C}">
+                <a14:useLocalDpi xmlns:a14="http://schemas.microsoft.com/office/drawing/2010/main" val="0"/>
+              </a:ext>
+            </a:extLst>
+          </a:blip>
+          <a:stretch>
+            <a:fillRect/>
+          </a:stretch>
+        </p:blipFill>
+        <p:spPr>
+          <a:xfrm>
+            <a:off x="10480367" y="556927"/>
+            <a:ext cx="596056" cy="596056"/>
+          </a:xfrm>
+          <a:prstGeom prst="rect">
+            <a:avLst/>
+          </a:prstGeom>
+        </p:spPr>
+      </p:pic>
     </p:spTree>
     <p:extLst>
       <p:ext uri="{BB962C8B-B14F-4D97-AF65-F5344CB8AC3E}">
@@ -6767,7 +8552,12 @@
           <a:bodyPr/>
           <a:lstStyle/>
           <a:p>
-            <a:endParaRPr lang="fr-FR"/>
+            <a:pPr algn="ctr"/>
+            <a:r>
+              <a:rPr lang="fr-FR" dirty="0" smtClean="0"/>
+              <a:t>Utilisateurs SITM</a:t>
+            </a:r>
+            <a:endParaRPr lang="fr-FR" dirty="0"/>
           </a:p>
         </p:txBody>
       </p:sp>
@@ -6786,10 +8576,80 @@
           <a:bodyPr/>
           <a:lstStyle/>
           <a:p>
-            <a:endParaRPr lang="fr-FR"/>
-          </a:p>
-        </p:txBody>
-      </p:sp>
+            <a:r>
+              <a:rPr lang="fr-FR" dirty="0" smtClean="0"/>
+              <a:t>Auditeurs sécurité</a:t>
+            </a:r>
+          </a:p>
+          <a:p>
+            <a:endParaRPr lang="fr-FR" dirty="0" smtClean="0"/>
+          </a:p>
+          <a:p>
+            <a:r>
+              <a:rPr lang="fr-FR" dirty="0" smtClean="0"/>
+              <a:t>Administrateurs réseau</a:t>
+            </a:r>
+          </a:p>
+          <a:p>
+            <a:endParaRPr lang="fr-FR" dirty="0" smtClean="0"/>
+          </a:p>
+          <a:p>
+            <a:r>
+              <a:rPr lang="fr-FR" dirty="0" smtClean="0"/>
+              <a:t>Consultants</a:t>
+            </a:r>
+          </a:p>
+          <a:p>
+            <a:endParaRPr lang="fr-FR" dirty="0" smtClean="0"/>
+          </a:p>
+          <a:p>
+            <a:r>
+              <a:rPr lang="fr-FR" dirty="0" smtClean="0"/>
+              <a:t>Hackers</a:t>
+            </a:r>
+          </a:p>
+          <a:p>
+            <a:endParaRPr lang="fr-FR" dirty="0" smtClean="0"/>
+          </a:p>
+          <a:p>
+            <a:r>
+              <a:rPr lang="fr-FR" dirty="0" smtClean="0"/>
+              <a:t>Personnes lambda</a:t>
+            </a:r>
+            <a:endParaRPr lang="fr-FR" dirty="0"/>
+          </a:p>
+        </p:txBody>
+      </p:sp>
+      <p:pic>
+        <p:nvPicPr>
+          <p:cNvPr id="4" name="Image 3"/>
+          <p:cNvPicPr>
+            <a:picLocks noChangeAspect="1"/>
+          </p:cNvPicPr>
+          <p:nvPr/>
+        </p:nvPicPr>
+        <p:blipFill>
+          <a:blip r:embed="rId2">
+            <a:extLst>
+              <a:ext uri="{28A0092B-C50C-407E-A947-70E740481C1C}">
+                <a14:useLocalDpi xmlns:a14="http://schemas.microsoft.com/office/drawing/2010/main" val="0"/>
+              </a:ext>
+            </a:extLst>
+          </a:blip>
+          <a:stretch>
+            <a:fillRect/>
+          </a:stretch>
+        </p:blipFill>
+        <p:spPr>
+          <a:xfrm>
+            <a:off x="10480367" y="556927"/>
+            <a:ext cx="596056" cy="596056"/>
+          </a:xfrm>
+          <a:prstGeom prst="rect">
+            <a:avLst/>
+          </a:prstGeom>
+        </p:spPr>
+      </p:pic>
     </p:spTree>
     <p:extLst>
       <p:ext uri="{BB962C8B-B14F-4D97-AF65-F5344CB8AC3E}">
@@ -6835,7 +8695,12 @@
           <a:bodyPr/>
           <a:lstStyle/>
           <a:p>
-            <a:endParaRPr lang="fr-FR"/>
+            <a:pPr algn="ctr"/>
+            <a:r>
+              <a:rPr lang="fr-FR" dirty="0" smtClean="0"/>
+              <a:t>Fonctionnalités</a:t>
+            </a:r>
+            <a:endParaRPr lang="fr-FR" dirty="0"/>
           </a:p>
         </p:txBody>
       </p:sp>
@@ -6854,10 +8719,91 @@
           <a:bodyPr/>
           <a:lstStyle/>
           <a:p>
-            <a:endParaRPr lang="fr-FR"/>
-          </a:p>
-        </p:txBody>
-      </p:sp>
+            <a:endParaRPr lang="fr-FR" dirty="0" smtClean="0"/>
+          </a:p>
+          <a:p>
+            <a:r>
+              <a:rPr lang="fr-FR" dirty="0" smtClean="0"/>
+              <a:t>Scanner </a:t>
+            </a:r>
+            <a:r>
+              <a:rPr lang="fr-FR" dirty="0" smtClean="0"/>
+              <a:t>l’intégralité du réseau</a:t>
+            </a:r>
+          </a:p>
+          <a:p>
+            <a:pPr lvl="1"/>
+            <a:r>
+              <a:rPr lang="fr-FR" dirty="0" smtClean="0"/>
+              <a:t>Envoie de paquets ARP, ICMP à toutes les adresses</a:t>
+            </a:r>
+          </a:p>
+          <a:p>
+            <a:pPr lvl="1"/>
+            <a:r>
+              <a:rPr lang="fr-FR" dirty="0" smtClean="0"/>
+              <a:t>Découverte des adresses MAC en fonction des réponses</a:t>
+            </a:r>
+          </a:p>
+          <a:p>
+            <a:endParaRPr lang="fr-FR" dirty="0" smtClean="0"/>
+          </a:p>
+          <a:p>
+            <a:r>
+              <a:rPr lang="fr-FR" dirty="0" smtClean="0"/>
+              <a:t>Modification </a:t>
+            </a:r>
+            <a:r>
+              <a:rPr lang="fr-FR" dirty="0" smtClean="0"/>
+              <a:t>table ARP</a:t>
+            </a:r>
+          </a:p>
+          <a:p>
+            <a:pPr lvl="1"/>
+            <a:r>
+              <a:rPr lang="fr-FR" dirty="0" smtClean="0"/>
+              <a:t>Envoi d’un paquet réponse ARP, indiquant que le routeur dispose de l’adresse MAC  de l’ordinateur interceptant les paquets</a:t>
+            </a:r>
+          </a:p>
+          <a:p>
+            <a:pPr lvl="1"/>
+            <a:r>
+              <a:rPr lang="fr-FR" dirty="0" smtClean="0"/>
+              <a:t>Vérification réception des paquets provenant de la victime</a:t>
+            </a:r>
+          </a:p>
+        </p:txBody>
+      </p:sp>
+      <p:pic>
+        <p:nvPicPr>
+          <p:cNvPr id="4" name="Image 3"/>
+          <p:cNvPicPr>
+            <a:picLocks noChangeAspect="1"/>
+          </p:cNvPicPr>
+          <p:nvPr/>
+        </p:nvPicPr>
+        <p:blipFill>
+          <a:blip r:embed="rId2">
+            <a:extLst>
+              <a:ext uri="{28A0092B-C50C-407E-A947-70E740481C1C}">
+                <a14:useLocalDpi xmlns:a14="http://schemas.microsoft.com/office/drawing/2010/main" val="0"/>
+              </a:ext>
+            </a:extLst>
+          </a:blip>
+          <a:stretch>
+            <a:fillRect/>
+          </a:stretch>
+        </p:blipFill>
+        <p:spPr>
+          <a:xfrm>
+            <a:off x="10480367" y="556927"/>
+            <a:ext cx="596056" cy="596056"/>
+          </a:xfrm>
+          <a:prstGeom prst="rect">
+            <a:avLst/>
+          </a:prstGeom>
+        </p:spPr>
+      </p:pic>
     </p:spTree>
     <p:extLst>
       <p:ext uri="{BB962C8B-B14F-4D97-AF65-F5344CB8AC3E}">
@@ -6903,7 +8849,12 @@
           <a:bodyPr/>
           <a:lstStyle/>
           <a:p>
-            <a:endParaRPr lang="fr-FR"/>
+            <a:pPr algn="ctr"/>
+            <a:r>
+              <a:rPr lang="fr-FR" dirty="0" smtClean="0"/>
+              <a:t>Fonctionnalités</a:t>
+            </a:r>
+            <a:endParaRPr lang="fr-FR" dirty="0"/>
           </a:p>
         </p:txBody>
       </p:sp>
@@ -6919,13 +8870,146 @@
         </p:nvSpPr>
         <p:spPr/>
         <p:txBody>
-          <a:bodyPr/>
-          <a:lstStyle/>
-          <a:p>
-            <a:endParaRPr lang="fr-FR"/>
-          </a:p>
-        </p:txBody>
-      </p:sp>
+          <a:bodyPr>
+            <a:normAutofit/>
+          </a:bodyPr>
+          <a:lstStyle/>
+          <a:p>
+            <a:r>
+              <a:rPr lang="fr-FR" dirty="0"/>
+              <a:t>Interception et reroutage des paquets</a:t>
+            </a:r>
+          </a:p>
+          <a:p>
+            <a:pPr lvl="1"/>
+            <a:r>
+              <a:rPr lang="fr-FR" dirty="0" smtClean="0"/>
+              <a:t>Lecture </a:t>
+            </a:r>
+            <a:r>
+              <a:rPr lang="fr-FR" dirty="0"/>
+              <a:t>et </a:t>
+            </a:r>
+            <a:r>
+              <a:rPr lang="fr-FR" dirty="0" smtClean="0"/>
+              <a:t>interprétation des paquets</a:t>
+            </a:r>
+            <a:endParaRPr lang="fr-FR" dirty="0"/>
+          </a:p>
+          <a:p>
+            <a:pPr lvl="1"/>
+            <a:r>
+              <a:rPr lang="fr-FR" dirty="0" smtClean="0"/>
+              <a:t>Modification et retransmission des </a:t>
+            </a:r>
+            <a:r>
+              <a:rPr lang="fr-FR" dirty="0" smtClean="0"/>
+              <a:t>paquets</a:t>
+            </a:r>
+          </a:p>
+          <a:p>
+            <a:r>
+              <a:rPr lang="fr-FR" dirty="0" smtClean="0"/>
+              <a:t>Création </a:t>
+            </a:r>
+            <a:r>
+              <a:rPr lang="fr-FR" dirty="0" smtClean="0"/>
+              <a:t>interface graphique</a:t>
+            </a:r>
+          </a:p>
+          <a:p>
+            <a:pPr lvl="1"/>
+            <a:r>
+              <a:rPr lang="fr-FR" dirty="0" smtClean="0"/>
+              <a:t>Librairie </a:t>
+            </a:r>
+            <a:r>
+              <a:rPr lang="fr-FR" dirty="0" smtClean="0"/>
+              <a:t>Curses</a:t>
+            </a:r>
+          </a:p>
+          <a:p>
+            <a:r>
+              <a:rPr lang="fr-FR" dirty="0" smtClean="0"/>
+              <a:t>Obtenir </a:t>
+            </a:r>
+            <a:r>
+              <a:rPr lang="fr-FR" dirty="0" smtClean="0"/>
+              <a:t>mots de passe transitant en clair</a:t>
+            </a:r>
+          </a:p>
+          <a:p>
+            <a:pPr lvl="1"/>
+            <a:r>
+              <a:rPr lang="fr-FR" dirty="0"/>
+              <a:t>É</a:t>
+            </a:r>
+            <a:r>
+              <a:rPr lang="fr-FR" dirty="0" smtClean="0"/>
+              <a:t>tude différents protocoles et système d’authentification</a:t>
+            </a:r>
+          </a:p>
+          <a:p>
+            <a:r>
+              <a:rPr lang="fr-FR" dirty="0" smtClean="0"/>
+              <a:t>Intégration cookie victime sur la machine attaquante</a:t>
+            </a:r>
+          </a:p>
+          <a:p>
+            <a:pPr lvl="1"/>
+            <a:r>
+              <a:rPr lang="fr-FR" dirty="0" smtClean="0"/>
+              <a:t>Etude des solutions pour intégrer les cookies sur Firefox</a:t>
+            </a:r>
+          </a:p>
+          <a:p>
+            <a:pPr lvl="1"/>
+            <a:endParaRPr lang="fr-FR" dirty="0" smtClean="0"/>
+          </a:p>
+          <a:p>
+            <a:pPr marL="457200" lvl="1" indent="0">
+              <a:buNone/>
+            </a:pPr>
+            <a:endParaRPr lang="fr-FR" dirty="0" smtClean="0"/>
+          </a:p>
+          <a:p>
+            <a:pPr marL="457200" lvl="1" indent="0">
+              <a:buNone/>
+            </a:pPr>
+            <a:endParaRPr lang="fr-FR" dirty="0"/>
+          </a:p>
+        </p:txBody>
+      </p:sp>
+      <p:pic>
+        <p:nvPicPr>
+          <p:cNvPr id="4" name="Image 3"/>
+          <p:cNvPicPr>
+            <a:picLocks noChangeAspect="1"/>
+          </p:cNvPicPr>
+          <p:nvPr/>
+        </p:nvPicPr>
+        <p:blipFill>
+          <a:blip r:embed="rId2">
+            <a:extLst>
+              <a:ext uri="{28A0092B-C50C-407E-A947-70E740481C1C}">
+                <a14:useLocalDpi xmlns:a14="http://schemas.microsoft.com/office/drawing/2010/main" val="0"/>
+              </a:ext>
+            </a:extLst>
+          </a:blip>
+          <a:stretch>
+            <a:fillRect/>
+          </a:stretch>
+        </p:blipFill>
+        <p:spPr>
+          <a:xfrm>
+            <a:off x="10480367" y="556927"/>
+            <a:ext cx="596056" cy="596056"/>
+          </a:xfrm>
+          <a:prstGeom prst="rect">
+            <a:avLst/>
+          </a:prstGeom>
+        </p:spPr>
+      </p:pic>
     </p:spTree>
     <p:extLst>
       <p:ext uri="{BB962C8B-B14F-4D97-AF65-F5344CB8AC3E}">

</xml_diff>

<commit_message>
evaluation barême, Modification orthographe
</commit_message>
<xml_diff>
--- a/Avant-Projet/Stalker In The Middle.pptx
+++ b/Avant-Projet/Stalker In The Middle.pptx
@@ -7214,11 +7214,7 @@
             <a:pPr lvl="1"/>
             <a:r>
               <a:rPr lang="fr-FR" dirty="0" smtClean="0"/>
-              <a:t>Envoi </a:t>
-            </a:r>
-            <a:r>
-              <a:rPr lang="fr-FR" dirty="0" smtClean="0"/>
-              <a:t>ordre du jour, prise de notes, rédaction compte-rendu</a:t>
+              <a:t>Envoi ordre du jour, prise de notes, rédaction compte-rendu</a:t>
             </a:r>
           </a:p>
           <a:p>
@@ -8724,11 +8720,7 @@
           <a:p>
             <a:r>
               <a:rPr lang="fr-FR" dirty="0" smtClean="0"/>
-              <a:t>Scanner </a:t>
-            </a:r>
-            <a:r>
-              <a:rPr lang="fr-FR" dirty="0" smtClean="0"/>
-              <a:t>l’intégralité du réseau</a:t>
+              <a:t>Scanner l’intégralité du réseau</a:t>
             </a:r>
           </a:p>
           <a:p>
@@ -8751,11 +8743,7 @@
           <a:p>
             <a:r>
               <a:rPr lang="fr-FR" dirty="0" smtClean="0"/>
-              <a:t>Modification </a:t>
-            </a:r>
-            <a:r>
-              <a:rPr lang="fr-FR" dirty="0" smtClean="0"/>
-              <a:t>table ARP</a:t>
+              <a:t>Modification table ARP</a:t>
             </a:r>
           </a:p>
           <a:p>
@@ -8900,42 +8888,26 @@
             <a:pPr lvl="1"/>
             <a:r>
               <a:rPr lang="fr-FR" dirty="0" smtClean="0"/>
-              <a:t>Modification et retransmission des </a:t>
-            </a:r>
-            <a:r>
-              <a:rPr lang="fr-FR" dirty="0" smtClean="0"/>
-              <a:t>paquets</a:t>
-            </a:r>
-          </a:p>
-          <a:p>
-            <a:r>
-              <a:rPr lang="fr-FR" dirty="0" smtClean="0"/>
-              <a:t>Création </a:t>
-            </a:r>
-            <a:r>
-              <a:rPr lang="fr-FR" dirty="0" smtClean="0"/>
-              <a:t>interface graphique</a:t>
+              <a:t>Modification et retransmission des paquets</a:t>
+            </a:r>
+          </a:p>
+          <a:p>
+            <a:r>
+              <a:rPr lang="fr-FR" dirty="0" smtClean="0"/>
+              <a:t>Création interface graphique</a:t>
             </a:r>
           </a:p>
           <a:p>
             <a:pPr lvl="1"/>
             <a:r>
               <a:rPr lang="fr-FR" dirty="0" smtClean="0"/>
-              <a:t>Librairie </a:t>
-            </a:r>
-            <a:r>
-              <a:rPr lang="fr-FR" dirty="0" smtClean="0"/>
-              <a:t>Curses</a:t>
-            </a:r>
-          </a:p>
-          <a:p>
-            <a:r>
-              <a:rPr lang="fr-FR" dirty="0" smtClean="0"/>
-              <a:t>Obtenir </a:t>
-            </a:r>
-            <a:r>
-              <a:rPr lang="fr-FR" dirty="0" smtClean="0"/>
-              <a:t>mots de passe transitant en clair</a:t>
+              <a:t>Librairie Curses</a:t>
+            </a:r>
+          </a:p>
+          <a:p>
+            <a:r>
+              <a:rPr lang="fr-FR" dirty="0" smtClean="0"/>
+              <a:t>Obtenir mots de passe transitant en clair</a:t>
             </a:r>
           </a:p>
           <a:p>
@@ -8958,8 +8930,12 @@
           <a:p>
             <a:pPr lvl="1"/>
             <a:r>
-              <a:rPr lang="fr-FR" dirty="0" smtClean="0"/>
-              <a:t>Etude des solutions pour intégrer les cookies sur Firefox</a:t>
+              <a:rPr lang="fr-FR" dirty="0"/>
+              <a:t>É</a:t>
+            </a:r>
+            <a:r>
+              <a:rPr lang="fr-FR" dirty="0" smtClean="0"/>
+              <a:t>tude des solutions pour intégrer les cookies sur Firefox</a:t>
             </a:r>
           </a:p>
           <a:p>

</xml_diff>